<commit_message>
Slides Tobe Big safe
</commit_message>
<xml_diff>
--- a/presentation and documentation/Narcovet.pptx
+++ b/presentation and documentation/Narcovet.pptx
@@ -10,11 +10,13 @@
     <p:sldId id="259" r:id="rId4"/>
     <p:sldId id="268" r:id="rId5"/>
     <p:sldId id="260" r:id="rId6"/>
-    <p:sldId id="262" r:id="rId7"/>
-    <p:sldId id="266" r:id="rId8"/>
-    <p:sldId id="263" r:id="rId9"/>
-    <p:sldId id="267" r:id="rId10"/>
-    <p:sldId id="265" r:id="rId11"/>
+    <p:sldId id="269" r:id="rId7"/>
+    <p:sldId id="270" r:id="rId8"/>
+    <p:sldId id="262" r:id="rId9"/>
+    <p:sldId id="266" r:id="rId10"/>
+    <p:sldId id="263" r:id="rId11"/>
+    <p:sldId id="267" r:id="rId12"/>
+    <p:sldId id="265" r:id="rId13"/>
   </p:sldIdLst>
   <p:sldSz cx="12192000" cy="6858000"/>
   <p:notesSz cx="6858000" cy="9144000"/>
@@ -121,6 +123,88 @@
 </p:presentation>
 </file>
 
+<file path=ppt/revisionInfo.xml><?xml version="1.0" encoding="utf-8"?>
+<p1510:revInfo xmlns:a="http://schemas.openxmlformats.org/drawingml/2006/main" xmlns:r="http://schemas.openxmlformats.org/officeDocument/2006/relationships" xmlns:p1510="http://schemas.microsoft.com/office/powerpoint/2015/10/main">
+  <p1510:revLst>
+    <p1510:client id="{D283D565-5E0F-4358-9CE6-C69BE254789E}" v="4" dt="2024-12-18T21:14:31.635"/>
+  </p1510:revLst>
+</p1510:revInfo>
+</file>
+
+<file path=ppt/changesInfos/changesInfo1.xml><?xml version="1.0" encoding="utf-8"?>
+<pc:chgInfo xmlns:a="http://schemas.openxmlformats.org/drawingml/2006/main" xmlns:r="http://schemas.openxmlformats.org/officeDocument/2006/relationships" xmlns:ac="http://schemas.microsoft.com/office/drawing/2013/main/command" xmlns:pc="http://schemas.microsoft.com/office/powerpoint/2013/main/command">
+  <pc:docChgLst>
+    <pc:chgData name="Giulia Bleichenbacher" userId="adda7aa309b1ce3d" providerId="LiveId" clId="{D283D565-5E0F-4358-9CE6-C69BE254789E}"/>
+    <pc:docChg chg="custSel addSld delSld modSld">
+      <pc:chgData name="Giulia Bleichenbacher" userId="adda7aa309b1ce3d" providerId="LiveId" clId="{D283D565-5E0F-4358-9CE6-C69BE254789E}" dt="2024-12-18T21:15:23.514" v="21" actId="1076"/>
+      <pc:docMkLst>
+        <pc:docMk/>
+      </pc:docMkLst>
+      <pc:sldChg chg="new del">
+        <pc:chgData name="Giulia Bleichenbacher" userId="adda7aa309b1ce3d" providerId="LiveId" clId="{D283D565-5E0F-4358-9CE6-C69BE254789E}" dt="2024-12-18T21:06:24.344" v="1" actId="47"/>
+        <pc:sldMkLst>
+          <pc:docMk/>
+          <pc:sldMk cId="2738305355" sldId="269"/>
+        </pc:sldMkLst>
+      </pc:sldChg>
+      <pc:sldChg chg="addSp modSp add mod">
+        <pc:chgData name="Giulia Bleichenbacher" userId="adda7aa309b1ce3d" providerId="LiveId" clId="{D283D565-5E0F-4358-9CE6-C69BE254789E}" dt="2024-12-18T21:13:14.017" v="9" actId="1076"/>
+        <pc:sldMkLst>
+          <pc:docMk/>
+          <pc:sldMk cId="4007687361" sldId="269"/>
+        </pc:sldMkLst>
+        <pc:picChg chg="add mod">
+          <ac:chgData name="Giulia Bleichenbacher" userId="adda7aa309b1ce3d" providerId="LiveId" clId="{D283D565-5E0F-4358-9CE6-C69BE254789E}" dt="2024-12-18T21:13:14.017" v="9" actId="1076"/>
+          <ac:picMkLst>
+            <pc:docMk/>
+            <pc:sldMk cId="4007687361" sldId="269"/>
+            <ac:picMk id="4" creationId="{F3197CD5-64EE-5EB5-3207-44DFE5C622E4}"/>
+          </ac:picMkLst>
+        </pc:picChg>
+      </pc:sldChg>
+      <pc:sldChg chg="add del">
+        <pc:chgData name="Giulia Bleichenbacher" userId="adda7aa309b1ce3d" providerId="LiveId" clId="{D283D565-5E0F-4358-9CE6-C69BE254789E}" dt="2024-12-18T21:12:48.719" v="4"/>
+        <pc:sldMkLst>
+          <pc:docMk/>
+          <pc:sldMk cId="3827934119" sldId="270"/>
+        </pc:sldMkLst>
+      </pc:sldChg>
+      <pc:sldChg chg="addSp delSp modSp add mod">
+        <pc:chgData name="Giulia Bleichenbacher" userId="adda7aa309b1ce3d" providerId="LiveId" clId="{D283D565-5E0F-4358-9CE6-C69BE254789E}" dt="2024-12-18T21:15:23.514" v="21" actId="1076"/>
+        <pc:sldMkLst>
+          <pc:docMk/>
+          <pc:sldMk cId="3861457530" sldId="270"/>
+        </pc:sldMkLst>
+        <pc:picChg chg="del">
+          <ac:chgData name="Giulia Bleichenbacher" userId="adda7aa309b1ce3d" providerId="LiveId" clId="{D283D565-5E0F-4358-9CE6-C69BE254789E}" dt="2024-12-18T21:14:34.576" v="11" actId="478"/>
+          <ac:picMkLst>
+            <pc:docMk/>
+            <pc:sldMk cId="3861457530" sldId="270"/>
+            <ac:picMk id="4" creationId="{6C129C04-971A-DE83-B6B0-D0B8C7BF8AF1}"/>
+          </ac:picMkLst>
+        </pc:picChg>
+        <pc:picChg chg="add mod">
+          <ac:chgData name="Giulia Bleichenbacher" userId="adda7aa309b1ce3d" providerId="LiveId" clId="{D283D565-5E0F-4358-9CE6-C69BE254789E}" dt="2024-12-18T21:14:53.389" v="17" actId="1076"/>
+          <ac:picMkLst>
+            <pc:docMk/>
+            <pc:sldMk cId="3861457530" sldId="270"/>
+            <ac:picMk id="5" creationId="{246CBE98-B6CB-CF9E-C6B6-52A6DE5558C9}"/>
+          </ac:picMkLst>
+        </pc:picChg>
+        <pc:picChg chg="add mod">
+          <ac:chgData name="Giulia Bleichenbacher" userId="adda7aa309b1ce3d" providerId="LiveId" clId="{D283D565-5E0F-4358-9CE6-C69BE254789E}" dt="2024-12-18T21:15:23.514" v="21" actId="1076"/>
+          <ac:picMkLst>
+            <pc:docMk/>
+            <pc:sldMk cId="3861457530" sldId="270"/>
+            <ac:picMk id="7" creationId="{799A162E-E863-6CAD-7358-D7CA6E2354D6}"/>
+          </ac:picMkLst>
+        </pc:picChg>
+      </pc:sldChg>
+    </pc:docChg>
+  </pc:docChgLst>
+</pc:chgInfo>
+</file>
+
 <file path=ppt/slideLayouts/slideLayout1.xml><?xml version="1.0" encoding="utf-8"?>
 <p:sldLayout xmlns:a="http://schemas.openxmlformats.org/drawingml/2006/main" xmlns:r="http://schemas.openxmlformats.org/officeDocument/2006/relationships" xmlns:p="http://schemas.openxmlformats.org/presentationml/2006/main" type="title" preserve="1">
   <p:cSld name="Titelfolie">
@@ -268,7 +352,7 @@
           <a:p>
             <a:fld id="{8E7E68AA-B059-46D2-BC07-C1FC2D1B532B}" type="datetimeFigureOut">
               <a:rPr lang="de-DE" smtClean="0"/>
-              <a:t>15.12.2024</a:t>
+              <a:t>18.12.2024</a:t>
             </a:fld>
             <a:endParaRPr lang="de-DE"/>
           </a:p>
@@ -526,7 +610,7 @@
           <a:p>
             <a:fld id="{8E7E68AA-B059-46D2-BC07-C1FC2D1B532B}" type="datetimeFigureOut">
               <a:rPr lang="de-DE" smtClean="0"/>
-              <a:t>15.12.2024</a:t>
+              <a:t>18.12.2024</a:t>
             </a:fld>
             <a:endParaRPr lang="de-DE"/>
           </a:p>
@@ -801,7 +885,7 @@
           <a:p>
             <a:fld id="{8E7E68AA-B059-46D2-BC07-C1FC2D1B532B}" type="datetimeFigureOut">
               <a:rPr lang="de-DE" smtClean="0"/>
-              <a:t>15.12.2024</a:t>
+              <a:t>18.12.2024</a:t>
             </a:fld>
             <a:endParaRPr lang="de-DE"/>
           </a:p>
@@ -1150,7 +1234,7 @@
           <a:p>
             <a:fld id="{8E7E68AA-B059-46D2-BC07-C1FC2D1B532B}" type="datetimeFigureOut">
               <a:rPr lang="de-DE" smtClean="0"/>
-              <a:t>15.12.2024</a:t>
+              <a:t>18.12.2024</a:t>
             </a:fld>
             <a:endParaRPr lang="de-DE"/>
           </a:p>
@@ -1562,7 +1646,7 @@
           <a:p>
             <a:fld id="{8E7E68AA-B059-46D2-BC07-C1FC2D1B532B}" type="datetimeFigureOut">
               <a:rPr lang="de-DE" smtClean="0"/>
-              <a:t>15.12.2024</a:t>
+              <a:t>18.12.2024</a:t>
             </a:fld>
             <a:endParaRPr lang="de-DE"/>
           </a:p>
@@ -1703,7 +1787,7 @@
           <a:p>
             <a:fld id="{8E7E68AA-B059-46D2-BC07-C1FC2D1B532B}" type="datetimeFigureOut">
               <a:rPr lang="de-DE" smtClean="0"/>
-              <a:t>15.12.2024</a:t>
+              <a:t>18.12.2024</a:t>
             </a:fld>
             <a:endParaRPr lang="de-DE"/>
           </a:p>
@@ -1880,7 +1964,7 @@
           <a:p>
             <a:fld id="{8E7E68AA-B059-46D2-BC07-C1FC2D1B532B}" type="datetimeFigureOut">
               <a:rPr lang="de-DE" smtClean="0"/>
-              <a:t>15.12.2024</a:t>
+              <a:t>18.12.2024</a:t>
             </a:fld>
             <a:endParaRPr lang="de-DE"/>
           </a:p>
@@ -2251,7 +2335,7 @@
           <a:p>
             <a:fld id="{8E7E68AA-B059-46D2-BC07-C1FC2D1B532B}" type="datetimeFigureOut">
               <a:rPr lang="de-DE" smtClean="0"/>
-              <a:t>15.12.2024</a:t>
+              <a:t>18.12.2024</a:t>
             </a:fld>
             <a:endParaRPr lang="de-DE"/>
           </a:p>
@@ -2539,7 +2623,7 @@
           <a:p>
             <a:fld id="{8E7E68AA-B059-46D2-BC07-C1FC2D1B532B}" type="datetimeFigureOut">
               <a:rPr lang="de-DE" smtClean="0"/>
-              <a:t>15.12.2024</a:t>
+              <a:t>18.12.2024</a:t>
             </a:fld>
             <a:endParaRPr lang="de-DE"/>
           </a:p>
@@ -2780,7 +2864,7 @@
           <a:p>
             <a:fld id="{8E7E68AA-B059-46D2-BC07-C1FC2D1B532B}" type="datetimeFigureOut">
               <a:rPr lang="de-DE" smtClean="0"/>
-              <a:t>15.12.2024</a:t>
+              <a:t>18.12.2024</a:t>
             </a:fld>
             <a:endParaRPr lang="de-DE" dirty="0"/>
           </a:p>
@@ -3763,6 +3847,595 @@
       </p:grpSpPr>
       <p:sp>
         <p:nvSpPr>
+          <p:cNvPr id="2" name="Titel 1">
+            <a:extLst>
+              <a:ext uri="{FF2B5EF4-FFF2-40B4-BE49-F238E27FC236}">
+                <a16:creationId xmlns:a16="http://schemas.microsoft.com/office/drawing/2014/main" id="{2E49F884-6A40-EE2A-90B8-8C104D63DBF1}"/>
+              </a:ext>
+            </a:extLst>
+          </p:cNvPr>
+          <p:cNvSpPr>
+            <a:spLocks noGrp="1"/>
+          </p:cNvSpPr>
+          <p:nvPr>
+            <p:ph type="title"/>
+          </p:nvPr>
+        </p:nvSpPr>
+        <p:spPr>
+          <a:xfrm>
+            <a:off x="838200" y="501743"/>
+            <a:ext cx="10515600" cy="1325563"/>
+          </a:xfrm>
+        </p:spPr>
+        <p:txBody>
+          <a:bodyPr/>
+          <a:lstStyle/>
+          <a:p>
+            <a:r>
+              <a:rPr lang="de-DE" dirty="0">
+                <a:solidFill>
+                  <a:schemeClr val="tx1">
+                    <a:lumMod val="50000"/>
+                    <a:lumOff val="50000"/>
+                  </a:schemeClr>
+                </a:solidFill>
+              </a:rPr>
+              <a:t>Demonstration</a:t>
+            </a:r>
+            <a:r>
+              <a:rPr lang="de-DE" dirty="0"/>
+              <a:t> </a:t>
+            </a:r>
+          </a:p>
+        </p:txBody>
+      </p:sp>
+      <p:sp>
+        <p:nvSpPr>
+          <p:cNvPr id="3" name="Inhaltsplatzhalter 2">
+            <a:extLst>
+              <a:ext uri="{FF2B5EF4-FFF2-40B4-BE49-F238E27FC236}">
+                <a16:creationId xmlns:a16="http://schemas.microsoft.com/office/drawing/2014/main" id="{306985A2-0C8B-1392-6737-3420007893C9}"/>
+              </a:ext>
+            </a:extLst>
+          </p:cNvPr>
+          <p:cNvSpPr>
+            <a:spLocks noGrp="1"/>
+          </p:cNvSpPr>
+          <p:nvPr>
+            <p:ph idx="1"/>
+          </p:nvPr>
+        </p:nvSpPr>
+        <p:spPr>
+          <a:xfrm>
+            <a:off x="838200" y="2004919"/>
+            <a:ext cx="10515600" cy="4351338"/>
+          </a:xfrm>
+        </p:spPr>
+        <p:txBody>
+          <a:bodyPr/>
+          <a:lstStyle/>
+          <a:p>
+            <a:r>
+              <a:rPr lang="de-DE" dirty="0"/>
+              <a:t>Video einfügen </a:t>
+            </a:r>
+          </a:p>
+        </p:txBody>
+      </p:sp>
+    </p:spTree>
+    <p:extLst>
+      <p:ext uri="{BB962C8B-B14F-4D97-AF65-F5344CB8AC3E}">
+        <p14:creationId xmlns:p14="http://schemas.microsoft.com/office/powerpoint/2010/main" val="1146317798"/>
+      </p:ext>
+    </p:extLst>
+  </p:cSld>
+  <p:clrMapOvr>
+    <a:masterClrMapping/>
+  </p:clrMapOvr>
+</p:sld>
+</file>
+
+<file path=ppt/slides/slide11.xml><?xml version="1.0" encoding="utf-8"?>
+<p:sld xmlns:a="http://schemas.openxmlformats.org/drawingml/2006/main" xmlns:r="http://schemas.openxmlformats.org/officeDocument/2006/relationships" xmlns:p="http://schemas.openxmlformats.org/presentationml/2006/main">
+  <p:cSld>
+    <p:spTree>
+      <p:nvGrpSpPr>
+        <p:cNvPr id="1" name=""/>
+        <p:cNvGrpSpPr/>
+        <p:nvPr/>
+      </p:nvGrpSpPr>
+      <p:grpSpPr>
+        <a:xfrm>
+          <a:off x="0" y="0"/>
+          <a:ext cx="0" cy="0"/>
+          <a:chOff x="0" y="0"/>
+          <a:chExt cx="0" cy="0"/>
+        </a:xfrm>
+      </p:grpSpPr>
+      <p:sp>
+        <p:nvSpPr>
+          <p:cNvPr id="2" name="Titel 1">
+            <a:extLst>
+              <a:ext uri="{FF2B5EF4-FFF2-40B4-BE49-F238E27FC236}">
+                <a16:creationId xmlns:a16="http://schemas.microsoft.com/office/drawing/2014/main" id="{22D8ECC0-E8B5-00F4-CDAC-994AFC71E380}"/>
+              </a:ext>
+            </a:extLst>
+          </p:cNvPr>
+          <p:cNvSpPr>
+            <a:spLocks noGrp="1"/>
+          </p:cNvSpPr>
+          <p:nvPr>
+            <p:ph type="title"/>
+          </p:nvPr>
+        </p:nvSpPr>
+        <p:spPr>
+          <a:xfrm>
+            <a:off x="838200" y="4872958"/>
+            <a:ext cx="10515600" cy="1325563"/>
+          </a:xfrm>
+        </p:spPr>
+        <p:txBody>
+          <a:bodyPr/>
+          <a:lstStyle/>
+          <a:p>
+            <a:r>
+              <a:rPr lang="de-DE" dirty="0">
+                <a:solidFill>
+                  <a:schemeClr val="tx1">
+                    <a:lumMod val="50000"/>
+                    <a:lumOff val="50000"/>
+                  </a:schemeClr>
+                </a:solidFill>
+              </a:rPr>
+              <a:t>Benefits</a:t>
+            </a:r>
+          </a:p>
+        </p:txBody>
+      </p:sp>
+      <p:sp>
+        <p:nvSpPr>
+          <p:cNvPr id="4" name="Textfeld 3">
+            <a:extLst>
+              <a:ext uri="{FF2B5EF4-FFF2-40B4-BE49-F238E27FC236}">
+                <a16:creationId xmlns:a16="http://schemas.microsoft.com/office/drawing/2014/main" id="{65756FEC-7821-2152-6E2C-7D131DA37680}"/>
+              </a:ext>
+            </a:extLst>
+          </p:cNvPr>
+          <p:cNvSpPr txBox="1"/>
+          <p:nvPr/>
+        </p:nvSpPr>
+        <p:spPr>
+          <a:xfrm>
+            <a:off x="838200" y="659479"/>
+            <a:ext cx="9403080" cy="3139321"/>
+          </a:xfrm>
+          <a:prstGeom prst="rect">
+            <a:avLst/>
+          </a:prstGeom>
+          <a:noFill/>
+        </p:spPr>
+        <p:txBody>
+          <a:bodyPr wrap="square" rtlCol="0">
+            <a:spAutoFit/>
+          </a:bodyPr>
+          <a:lstStyle/>
+          <a:p>
+            <a:r>
+              <a:rPr lang="de-DE" dirty="0" err="1"/>
+              <a:t>Reduction</a:t>
+            </a:r>
+            <a:r>
+              <a:rPr lang="de-DE" dirty="0"/>
+              <a:t> </a:t>
+            </a:r>
+            <a:r>
+              <a:rPr lang="de-DE" dirty="0" err="1"/>
+              <a:t>of</a:t>
+            </a:r>
+            <a:r>
+              <a:rPr lang="de-DE" dirty="0"/>
+              <a:t> </a:t>
+            </a:r>
+            <a:r>
+              <a:rPr lang="de-DE" dirty="0" err="1"/>
+              <a:t>hours</a:t>
+            </a:r>
+            <a:r>
+              <a:rPr lang="de-DE" dirty="0"/>
+              <a:t> </a:t>
+            </a:r>
+            <a:r>
+              <a:rPr lang="de-DE" dirty="0" err="1"/>
+              <a:t>spent</a:t>
+            </a:r>
+            <a:r>
+              <a:rPr lang="de-DE" dirty="0"/>
+              <a:t> on </a:t>
+            </a:r>
+            <a:r>
+              <a:rPr lang="de-DE" dirty="0" err="1"/>
+              <a:t>narcotics</a:t>
+            </a:r>
+            <a:r>
+              <a:rPr lang="de-DE" dirty="0"/>
+              <a:t> </a:t>
+            </a:r>
+            <a:r>
+              <a:rPr lang="de-DE" dirty="0" err="1"/>
+              <a:t>management</a:t>
+            </a:r>
+            <a:r>
+              <a:rPr lang="de-DE" dirty="0"/>
+              <a:t> </a:t>
+            </a:r>
+            <a:r>
+              <a:rPr lang="de-DE" dirty="0" err="1"/>
+              <a:t>reduced</a:t>
+            </a:r>
+            <a:r>
+              <a:rPr lang="de-DE" dirty="0"/>
+              <a:t> </a:t>
+            </a:r>
+            <a:r>
+              <a:rPr lang="de-DE" dirty="0" err="1"/>
+              <a:t>by</a:t>
+            </a:r>
+            <a:r>
+              <a:rPr lang="de-DE" dirty="0"/>
+              <a:t> </a:t>
+            </a:r>
+            <a:r>
+              <a:rPr lang="de-DE" dirty="0" err="1"/>
+              <a:t>estimated</a:t>
+            </a:r>
+            <a:r>
+              <a:rPr lang="de-DE" dirty="0"/>
+              <a:t>: </a:t>
+            </a:r>
+          </a:p>
+          <a:p>
+            <a:r>
+              <a:rPr lang="de-DE" dirty="0"/>
+              <a:t>180h per </a:t>
+            </a:r>
+            <a:r>
+              <a:rPr lang="de-DE" dirty="0" err="1"/>
+              <a:t>year</a:t>
+            </a:r>
+            <a:r>
+              <a:rPr lang="de-DE" dirty="0"/>
+              <a:t> </a:t>
+            </a:r>
+            <a:r>
+              <a:rPr lang="de-DE" dirty="0" err="1"/>
+              <a:t>without</a:t>
+            </a:r>
+            <a:r>
+              <a:rPr lang="de-DE" dirty="0"/>
+              <a:t> </a:t>
+            </a:r>
+            <a:r>
+              <a:rPr lang="de-DE" dirty="0" err="1"/>
+              <a:t>Narcovets</a:t>
+            </a:r>
+            <a:r>
+              <a:rPr lang="de-DE" dirty="0"/>
+              <a:t> </a:t>
+            </a:r>
+          </a:p>
+          <a:p>
+            <a:r>
+              <a:rPr lang="de-DE" dirty="0"/>
+              <a:t>67h per </a:t>
+            </a:r>
+            <a:r>
+              <a:rPr lang="de-DE" dirty="0" err="1"/>
+              <a:t>year</a:t>
+            </a:r>
+            <a:r>
+              <a:rPr lang="de-DE" dirty="0"/>
+              <a:t> </a:t>
+            </a:r>
+            <a:r>
+              <a:rPr lang="de-DE" dirty="0" err="1"/>
+              <a:t>with</a:t>
+            </a:r>
+            <a:r>
+              <a:rPr lang="de-DE" dirty="0"/>
+              <a:t> </a:t>
+            </a:r>
+            <a:r>
+              <a:rPr lang="de-DE" dirty="0" err="1"/>
+              <a:t>Narcovets</a:t>
+            </a:r>
+            <a:r>
+              <a:rPr lang="de-DE" dirty="0"/>
+              <a:t> </a:t>
+            </a:r>
+          </a:p>
+          <a:p>
+            <a:r>
+              <a:rPr lang="de-DE" dirty="0"/>
+              <a:t> </a:t>
+            </a:r>
+          </a:p>
+          <a:p>
+            <a:r>
+              <a:rPr lang="de-DE" dirty="0" err="1"/>
+              <a:t>Reduction</a:t>
+            </a:r>
+            <a:r>
+              <a:rPr lang="de-DE" dirty="0"/>
+              <a:t> on </a:t>
+            </a:r>
+            <a:r>
+              <a:rPr lang="de-DE" dirty="0" err="1"/>
+              <a:t>money</a:t>
+            </a:r>
+            <a:r>
+              <a:rPr lang="de-DE" dirty="0"/>
+              <a:t> </a:t>
+            </a:r>
+            <a:r>
+              <a:rPr lang="de-DE" dirty="0" err="1"/>
+              <a:t>spent</a:t>
+            </a:r>
+            <a:r>
+              <a:rPr lang="de-DE" dirty="0"/>
+              <a:t> on </a:t>
+            </a:r>
+            <a:r>
+              <a:rPr lang="de-DE" dirty="0" err="1"/>
+              <a:t>narcotics</a:t>
+            </a:r>
+            <a:r>
+              <a:rPr lang="de-DE" dirty="0"/>
+              <a:t> </a:t>
+            </a:r>
+            <a:r>
+              <a:rPr lang="de-DE" dirty="0" err="1"/>
+              <a:t>management</a:t>
+            </a:r>
+            <a:r>
+              <a:rPr lang="de-DE" dirty="0"/>
+              <a:t> </a:t>
+            </a:r>
+            <a:r>
+              <a:rPr lang="de-DE" dirty="0" err="1"/>
+              <a:t>reduced</a:t>
+            </a:r>
+            <a:r>
+              <a:rPr lang="de-DE" dirty="0"/>
+              <a:t> </a:t>
+            </a:r>
+            <a:r>
+              <a:rPr lang="de-DE" dirty="0" err="1"/>
+              <a:t>by</a:t>
+            </a:r>
+            <a:r>
+              <a:rPr lang="de-DE" dirty="0"/>
+              <a:t> </a:t>
+            </a:r>
+            <a:r>
+              <a:rPr lang="de-DE" dirty="0" err="1"/>
+              <a:t>estimated</a:t>
+            </a:r>
+            <a:r>
+              <a:rPr lang="de-DE" dirty="0"/>
+              <a:t>:</a:t>
+            </a:r>
+          </a:p>
+          <a:p>
+            <a:r>
+              <a:rPr lang="de-DE" dirty="0"/>
+              <a:t>10.000CHF per </a:t>
+            </a:r>
+            <a:r>
+              <a:rPr lang="de-DE" dirty="0" err="1"/>
+              <a:t>year</a:t>
+            </a:r>
+            <a:r>
+              <a:rPr lang="de-DE" dirty="0"/>
+              <a:t> </a:t>
+            </a:r>
+            <a:r>
+              <a:rPr lang="de-DE" dirty="0" err="1"/>
+              <a:t>without</a:t>
+            </a:r>
+            <a:r>
+              <a:rPr lang="de-DE" dirty="0"/>
+              <a:t> </a:t>
+            </a:r>
+            <a:r>
+              <a:rPr lang="de-DE" dirty="0" err="1"/>
+              <a:t>Narcovets</a:t>
+            </a:r>
+            <a:r>
+              <a:rPr lang="de-DE" dirty="0"/>
+              <a:t> </a:t>
+            </a:r>
+          </a:p>
+          <a:p>
+            <a:r>
+              <a:rPr lang="de-DE" dirty="0"/>
+              <a:t> 5.000CHF per </a:t>
+            </a:r>
+            <a:r>
+              <a:rPr lang="de-DE" dirty="0" err="1"/>
+              <a:t>year</a:t>
+            </a:r>
+            <a:r>
+              <a:rPr lang="de-DE" dirty="0"/>
+              <a:t> </a:t>
+            </a:r>
+            <a:r>
+              <a:rPr lang="de-DE" dirty="0" err="1"/>
+              <a:t>with</a:t>
+            </a:r>
+            <a:r>
+              <a:rPr lang="de-DE" dirty="0"/>
+              <a:t> </a:t>
+            </a:r>
+            <a:r>
+              <a:rPr lang="de-DE" dirty="0" err="1"/>
+              <a:t>Narcovets</a:t>
+            </a:r>
+            <a:r>
+              <a:rPr lang="de-DE" dirty="0"/>
+              <a:t> </a:t>
+            </a:r>
+          </a:p>
+          <a:p>
+            <a:endParaRPr lang="de-DE" dirty="0"/>
+          </a:p>
+          <a:p>
+            <a:r>
+              <a:rPr lang="de-DE" dirty="0"/>
+              <a:t>On top: </a:t>
+            </a:r>
+          </a:p>
+          <a:p>
+            <a:pPr marL="285750" indent="-285750">
+              <a:buFontTx/>
+              <a:buChar char="-"/>
+            </a:pPr>
+            <a:r>
+              <a:rPr lang="de-DE" dirty="0" err="1"/>
+              <a:t>Centralized</a:t>
+            </a:r>
+            <a:r>
+              <a:rPr lang="de-DE" dirty="0"/>
+              <a:t> </a:t>
+            </a:r>
+            <a:r>
+              <a:rPr lang="de-DE" dirty="0" err="1"/>
+              <a:t>documentation</a:t>
+            </a:r>
+            <a:r>
+              <a:rPr lang="de-DE" dirty="0"/>
+              <a:t> </a:t>
+            </a:r>
+          </a:p>
+          <a:p>
+            <a:pPr marL="285750" indent="-285750">
+              <a:buFontTx/>
+              <a:buChar char="-"/>
+            </a:pPr>
+            <a:r>
+              <a:rPr lang="de-DE" dirty="0" err="1"/>
+              <a:t>Less</a:t>
+            </a:r>
+            <a:r>
+              <a:rPr lang="de-DE" dirty="0"/>
+              <a:t> </a:t>
+            </a:r>
+            <a:r>
+              <a:rPr lang="de-DE" dirty="0" err="1"/>
+              <a:t>risk</a:t>
+            </a:r>
+            <a:r>
+              <a:rPr lang="de-DE" dirty="0"/>
+              <a:t> </a:t>
+            </a:r>
+            <a:r>
+              <a:rPr lang="de-DE" dirty="0" err="1"/>
+              <a:t>for</a:t>
+            </a:r>
+            <a:r>
+              <a:rPr lang="de-DE" dirty="0"/>
+              <a:t> human </a:t>
+            </a:r>
+            <a:r>
+              <a:rPr lang="de-DE" dirty="0" err="1"/>
+              <a:t>errors</a:t>
+            </a:r>
+            <a:r>
+              <a:rPr lang="de-DE" dirty="0"/>
+              <a:t> </a:t>
+            </a:r>
+            <a:r>
+              <a:rPr lang="de-DE" dirty="0" err="1"/>
+              <a:t>or</a:t>
+            </a:r>
+            <a:r>
+              <a:rPr lang="de-DE" dirty="0"/>
+              <a:t> human </a:t>
+            </a:r>
+            <a:r>
+              <a:rPr lang="de-DE" dirty="0" err="1"/>
+              <a:t>intervention</a:t>
+            </a:r>
+            <a:r>
+              <a:rPr lang="de-DE" dirty="0"/>
+              <a:t> </a:t>
+            </a:r>
+            <a:r>
+              <a:rPr lang="de-DE" dirty="0" err="1"/>
+              <a:t>to</a:t>
+            </a:r>
+            <a:r>
+              <a:rPr lang="de-DE" dirty="0"/>
+              <a:t> </a:t>
+            </a:r>
+            <a:r>
+              <a:rPr lang="de-DE" dirty="0" err="1"/>
+              <a:t>cheat</a:t>
+            </a:r>
+            <a:r>
+              <a:rPr lang="de-DE" dirty="0"/>
+              <a:t> </a:t>
+            </a:r>
+            <a:r>
+              <a:rPr lang="de-DE" dirty="0" err="1"/>
+              <a:t>wrong</a:t>
+            </a:r>
+            <a:r>
+              <a:rPr lang="de-DE" dirty="0"/>
+              <a:t> </a:t>
+            </a:r>
+            <a:r>
+              <a:rPr lang="de-DE" dirty="0" err="1"/>
+              <a:t>numbers</a:t>
+            </a:r>
+            <a:r>
+              <a:rPr lang="de-DE" dirty="0"/>
+              <a:t> </a:t>
+            </a:r>
+          </a:p>
+        </p:txBody>
+      </p:sp>
+    </p:spTree>
+    <p:extLst>
+      <p:ext uri="{BB962C8B-B14F-4D97-AF65-F5344CB8AC3E}">
+        <p14:creationId xmlns:p14="http://schemas.microsoft.com/office/powerpoint/2010/main" val="4087394814"/>
+      </p:ext>
+    </p:extLst>
+  </p:cSld>
+  <p:clrMapOvr>
+    <a:masterClrMapping/>
+  </p:clrMapOvr>
+</p:sld>
+</file>
+
+<file path=ppt/slides/slide12.xml><?xml version="1.0" encoding="utf-8"?>
+<p:sld xmlns:a="http://schemas.openxmlformats.org/drawingml/2006/main" xmlns:r="http://schemas.openxmlformats.org/officeDocument/2006/relationships" xmlns:p="http://schemas.openxmlformats.org/presentationml/2006/main">
+  <p:cSld>
+    <p:spTree>
+      <p:nvGrpSpPr>
+        <p:cNvPr id="1" name=""/>
+        <p:cNvGrpSpPr/>
+        <p:nvPr/>
+      </p:nvGrpSpPr>
+      <p:grpSpPr>
+        <a:xfrm>
+          <a:off x="0" y="0"/>
+          <a:ext cx="0" cy="0"/>
+          <a:chOff x="0" y="0"/>
+          <a:chExt cx="0" cy="0"/>
+        </a:xfrm>
+      </p:grpSpPr>
+      <p:sp>
+        <p:nvSpPr>
           <p:cNvPr id="3" name="Textfeld 2">
             <a:extLst>
               <a:ext uri="{FF2B5EF4-FFF2-40B4-BE49-F238E27FC236}">
@@ -5727,7 +6400,13 @@
   <p:cSld>
     <p:spTree>
       <p:nvGrpSpPr>
-        <p:cNvPr id="1" name=""/>
+        <p:cNvPr id="1" name="">
+          <a:extLst>
+            <a:ext uri="{FF2B5EF4-FFF2-40B4-BE49-F238E27FC236}">
+              <a16:creationId xmlns:a16="http://schemas.microsoft.com/office/drawing/2014/main" id="{D8C2AE16-11D5-B1A8-0679-BB8429035408}"/>
+            </a:ext>
+          </a:extLst>
+        </p:cNvPr>
         <p:cNvGrpSpPr/>
         <p:nvPr/>
       </p:nvGrpSpPr>
@@ -5744,7 +6423,7 @@
           <p:cNvPr id="2" name="Titel 1">
             <a:extLst>
               <a:ext uri="{FF2B5EF4-FFF2-40B4-BE49-F238E27FC236}">
-                <a16:creationId xmlns:a16="http://schemas.microsoft.com/office/drawing/2014/main" id="{C77BCFB3-2ECD-706A-3128-06DCE4D8CA3C}"/>
+                <a16:creationId xmlns:a16="http://schemas.microsoft.com/office/drawing/2014/main" id="{D1D935BA-D378-C1DB-F0E6-F5EED2B95201}"/>
               </a:ext>
             </a:extLst>
           </p:cNvPr>
@@ -5757,7 +6436,7 @@
         </p:nvSpPr>
         <p:spPr>
           <a:xfrm>
-            <a:off x="841513" y="500062"/>
+            <a:off x="838200" y="4883336"/>
             <a:ext cx="10515600" cy="1325563"/>
           </a:xfrm>
         </p:spPr>
@@ -5774,7 +6453,7 @@
                   </a:schemeClr>
                 </a:solidFill>
               </a:rPr>
-              <a:t>The </a:t>
+              <a:t>TO BE </a:t>
             </a:r>
             <a:r>
               <a:rPr lang="de-DE" dirty="0" err="1">
@@ -5785,51 +6464,7 @@
                   </a:schemeClr>
                 </a:solidFill>
               </a:rPr>
-              <a:t>solution</a:t>
-            </a:r>
-            <a:r>
-              <a:rPr lang="de-DE" dirty="0">
-                <a:solidFill>
-                  <a:schemeClr val="tx1">
-                    <a:lumMod val="50000"/>
-                    <a:lumOff val="50000"/>
-                  </a:schemeClr>
-                </a:solidFill>
-              </a:rPr>
-              <a:t> </a:t>
-            </a:r>
-            <a:r>
-              <a:rPr lang="de-DE" dirty="0" err="1">
-                <a:solidFill>
-                  <a:schemeClr val="tx1">
-                    <a:lumMod val="50000"/>
-                    <a:lumOff val="50000"/>
-                  </a:schemeClr>
-                </a:solidFill>
-              </a:rPr>
-              <a:t>we</a:t>
-            </a:r>
-            <a:r>
-              <a:rPr lang="de-DE" dirty="0">
-                <a:solidFill>
-                  <a:schemeClr val="tx1">
-                    <a:lumMod val="50000"/>
-                    <a:lumOff val="50000"/>
-                  </a:schemeClr>
-                </a:solidFill>
-              </a:rPr>
-              <a:t> </a:t>
-            </a:r>
-            <a:r>
-              <a:rPr lang="de-DE" dirty="0" err="1">
-                <a:solidFill>
-                  <a:schemeClr val="tx1">
-                    <a:lumMod val="50000"/>
-                    <a:lumOff val="50000"/>
-                  </a:schemeClr>
-                </a:solidFill>
-              </a:rPr>
-              <a:t>provide</a:t>
+              <a:t>Process</a:t>
             </a:r>
             <a:endParaRPr lang="de-DE" dirty="0">
               <a:solidFill>
@@ -5842,285 +6477,40 @@
           </a:p>
         </p:txBody>
       </p:sp>
-      <p:sp>
-        <p:nvSpPr>
-          <p:cNvPr id="3" name="Inhaltsplatzhalter 2">
-            <a:extLst>
-              <a:ext uri="{FF2B5EF4-FFF2-40B4-BE49-F238E27FC236}">
-                <a16:creationId xmlns:a16="http://schemas.microsoft.com/office/drawing/2014/main" id="{B4F46ABD-8990-3714-E9FF-EE7A6C6357C4}"/>
-              </a:ext>
-            </a:extLst>
-          </p:cNvPr>
-          <p:cNvSpPr>
-            <a:spLocks noGrp="1"/>
-          </p:cNvSpPr>
-          <p:nvPr>
-            <p:ph idx="1"/>
-          </p:nvPr>
-        </p:nvSpPr>
+      <p:pic>
+        <p:nvPicPr>
+          <p:cNvPr id="4" name="Grafik 3">
+            <a:extLst>
+              <a:ext uri="{FF2B5EF4-FFF2-40B4-BE49-F238E27FC236}">
+                <a16:creationId xmlns:a16="http://schemas.microsoft.com/office/drawing/2014/main" id="{F3197CD5-64EE-5EB5-3207-44DFE5C622E4}"/>
+              </a:ext>
+            </a:extLst>
+          </p:cNvPr>
+          <p:cNvPicPr>
+            <a:picLocks noChangeAspect="1"/>
+          </p:cNvPicPr>
+          <p:nvPr/>
+        </p:nvPicPr>
+        <p:blipFill>
+          <a:blip r:embed="rId2"/>
+          <a:stretch>
+            <a:fillRect/>
+          </a:stretch>
+        </p:blipFill>
         <p:spPr>
           <a:xfrm>
-            <a:off x="841513" y="2006600"/>
-            <a:ext cx="10515600" cy="4351338"/>
+            <a:off x="0" y="1228118"/>
+            <a:ext cx="11712312" cy="3468573"/>
           </a:xfrm>
+          <a:prstGeom prst="rect">
+            <a:avLst/>
+          </a:prstGeom>
         </p:spPr>
-        <p:txBody>
-          <a:bodyPr>
-            <a:normAutofit lnSpcReduction="10000"/>
-          </a:bodyPr>
-          <a:lstStyle/>
-          <a:p>
-            <a:r>
-              <a:rPr lang="de-DE" dirty="0" err="1"/>
-              <a:t>talking</a:t>
-            </a:r>
-            <a:r>
-              <a:rPr lang="de-DE" dirty="0"/>
-              <a:t> </a:t>
-            </a:r>
-            <a:r>
-              <a:rPr lang="de-DE" dirty="0" err="1"/>
-              <a:t>about</a:t>
-            </a:r>
-            <a:r>
-              <a:rPr lang="de-DE" dirty="0"/>
-              <a:t> </a:t>
-            </a:r>
-            <a:r>
-              <a:rPr lang="de-DE" dirty="0" err="1"/>
-              <a:t>technical</a:t>
-            </a:r>
-            <a:r>
-              <a:rPr lang="de-DE" dirty="0"/>
-              <a:t> </a:t>
-            </a:r>
-            <a:r>
-              <a:rPr lang="de-DE" dirty="0" err="1"/>
-              <a:t>details</a:t>
-            </a:r>
-            <a:endParaRPr lang="de-DE" dirty="0"/>
-          </a:p>
-          <a:p>
-            <a:r>
-              <a:rPr lang="de-DE" dirty="0"/>
-              <a:t>Automation:</a:t>
-            </a:r>
-          </a:p>
-          <a:p>
-            <a:pPr lvl="1"/>
-            <a:r>
-              <a:rPr lang="de-DE" dirty="0"/>
-              <a:t> </a:t>
-            </a:r>
-            <a:r>
-              <a:rPr lang="de-DE" dirty="0" err="1"/>
-              <a:t>inventory</a:t>
-            </a:r>
-            <a:r>
-              <a:rPr lang="de-DE" dirty="0"/>
-              <a:t> </a:t>
-            </a:r>
-            <a:r>
-              <a:rPr lang="de-DE" dirty="0" err="1"/>
-              <a:t>is</a:t>
-            </a:r>
-            <a:r>
-              <a:rPr lang="de-DE" dirty="0"/>
-              <a:t> </a:t>
-            </a:r>
-            <a:r>
-              <a:rPr lang="de-DE" dirty="0" err="1"/>
-              <a:t>checked</a:t>
-            </a:r>
-            <a:r>
-              <a:rPr lang="de-DE" dirty="0"/>
-              <a:t> </a:t>
-            </a:r>
-            <a:r>
-              <a:rPr lang="de-DE" dirty="0" err="1"/>
-              <a:t>as</a:t>
-            </a:r>
-            <a:r>
-              <a:rPr lang="de-DE" dirty="0"/>
-              <a:t> time </a:t>
-            </a:r>
-            <a:r>
-              <a:rPr lang="de-DE" dirty="0" err="1"/>
-              <a:t>event</a:t>
-            </a:r>
-            <a:r>
-              <a:rPr lang="de-DE" dirty="0"/>
-              <a:t> </a:t>
-            </a:r>
-            <a:r>
-              <a:rPr lang="de-DE" dirty="0" err="1"/>
-              <a:t>automatically</a:t>
-            </a:r>
-            <a:endParaRPr lang="de-DE" dirty="0"/>
-          </a:p>
-          <a:p>
-            <a:pPr lvl="2"/>
-            <a:r>
-              <a:rPr lang="de-DE" dirty="0"/>
-              <a:t>Returns </a:t>
-            </a:r>
-            <a:r>
-              <a:rPr lang="de-DE" dirty="0" err="1"/>
-              <a:t>if</a:t>
-            </a:r>
-            <a:r>
-              <a:rPr lang="de-DE" dirty="0"/>
-              <a:t> </a:t>
-            </a:r>
-            <a:r>
-              <a:rPr lang="de-DE" dirty="0" err="1"/>
-              <a:t>threshold</a:t>
-            </a:r>
-            <a:r>
-              <a:rPr lang="de-DE" dirty="0"/>
-              <a:t> </a:t>
-            </a:r>
-            <a:r>
-              <a:rPr lang="de-DE" dirty="0" err="1"/>
-              <a:t>is</a:t>
-            </a:r>
-            <a:r>
-              <a:rPr lang="de-DE" dirty="0"/>
-              <a:t> </a:t>
-            </a:r>
-            <a:r>
-              <a:rPr lang="de-DE" dirty="0" err="1"/>
-              <a:t>under</a:t>
-            </a:r>
-            <a:r>
-              <a:rPr lang="de-DE" dirty="0"/>
-              <a:t> </a:t>
-            </a:r>
-            <a:r>
-              <a:rPr lang="de-DE" dirty="0" err="1"/>
-              <a:t>orover</a:t>
-            </a:r>
-            <a:r>
-              <a:rPr lang="de-DE" dirty="0"/>
-              <a:t> </a:t>
-            </a:r>
-            <a:r>
-              <a:rPr lang="de-DE" dirty="0" err="1"/>
-              <a:t>limit</a:t>
-            </a:r>
-            <a:r>
-              <a:rPr lang="de-DE" dirty="0"/>
-              <a:t> </a:t>
-            </a:r>
-          </a:p>
-          <a:p>
-            <a:pPr lvl="1"/>
-            <a:r>
-              <a:rPr lang="de-DE" dirty="0" err="1"/>
-              <a:t>placeholder</a:t>
-            </a:r>
-            <a:endParaRPr lang="de-DE" dirty="0"/>
-          </a:p>
-          <a:p>
-            <a:pPr marL="0" indent="0">
-              <a:buNone/>
-            </a:pPr>
-            <a:endParaRPr lang="de-DE" dirty="0"/>
-          </a:p>
-          <a:p>
-            <a:r>
-              <a:rPr lang="de-DE" dirty="0" err="1"/>
-              <a:t>Unification</a:t>
-            </a:r>
-            <a:r>
-              <a:rPr lang="de-DE" dirty="0"/>
-              <a:t>: </a:t>
-            </a:r>
-          </a:p>
-          <a:p>
-            <a:r>
-              <a:rPr lang="de-DE" dirty="0" err="1"/>
-              <a:t>Decision</a:t>
-            </a:r>
-            <a:r>
-              <a:rPr lang="de-DE" dirty="0"/>
-              <a:t> support: </a:t>
-            </a:r>
-          </a:p>
-          <a:p>
-            <a:r>
-              <a:rPr lang="de-DE" dirty="0"/>
-              <a:t> </a:t>
-            </a:r>
-            <a:r>
-              <a:rPr lang="de-DE" dirty="0" err="1"/>
-              <a:t>use</a:t>
-            </a:r>
-            <a:r>
-              <a:rPr lang="de-DE" dirty="0"/>
-              <a:t> </a:t>
-            </a:r>
-            <a:r>
-              <a:rPr lang="de-DE" dirty="0" err="1"/>
-              <a:t>of</a:t>
-            </a:r>
-            <a:r>
-              <a:rPr lang="de-DE" dirty="0"/>
-              <a:t> </a:t>
-            </a:r>
-            <a:r>
-              <a:rPr lang="de-DE" dirty="0" err="1"/>
-              <a:t>Camunda</a:t>
-            </a:r>
-            <a:r>
-              <a:rPr lang="de-DE" dirty="0"/>
-              <a:t>, Python, </a:t>
-            </a:r>
-          </a:p>
-          <a:p>
-            <a:r>
-              <a:rPr lang="de-DE" dirty="0"/>
-              <a:t>Multiple </a:t>
-            </a:r>
-            <a:r>
-              <a:rPr lang="de-DE" dirty="0" err="1"/>
-              <a:t>service</a:t>
-            </a:r>
-            <a:r>
-              <a:rPr lang="de-DE" dirty="0"/>
-              <a:t> </a:t>
-            </a:r>
-            <a:r>
-              <a:rPr lang="de-DE" dirty="0" err="1"/>
-              <a:t>tasks</a:t>
-            </a:r>
-            <a:r>
-              <a:rPr lang="de-DE" dirty="0"/>
-              <a:t>, </a:t>
-            </a:r>
-            <a:r>
-              <a:rPr lang="de-DE" dirty="0" err="1"/>
-              <a:t>Decision</a:t>
-            </a:r>
-            <a:r>
-              <a:rPr lang="de-DE" dirty="0"/>
-              <a:t> </a:t>
-            </a:r>
-            <a:r>
-              <a:rPr lang="de-DE" dirty="0" err="1"/>
-              <a:t>modeling</a:t>
-            </a:r>
-            <a:r>
-              <a:rPr lang="de-DE" dirty="0"/>
-              <a:t> </a:t>
-            </a:r>
-          </a:p>
-        </p:txBody>
-      </p:sp>
+      </p:pic>
     </p:spTree>
     <p:extLst>
       <p:ext uri="{BB962C8B-B14F-4D97-AF65-F5344CB8AC3E}">
-        <p14:creationId xmlns:p14="http://schemas.microsoft.com/office/powerpoint/2010/main" val="1415540745"/>
+        <p14:creationId xmlns:p14="http://schemas.microsoft.com/office/powerpoint/2010/main" val="4007687361"/>
       </p:ext>
     </p:extLst>
   </p:cSld>
@@ -6135,7 +6525,13 @@
   <p:cSld>
     <p:spTree>
       <p:nvGrpSpPr>
-        <p:cNvPr id="1" name=""/>
+        <p:cNvPr id="1" name="">
+          <a:extLst>
+            <a:ext uri="{FF2B5EF4-FFF2-40B4-BE49-F238E27FC236}">
+              <a16:creationId xmlns:a16="http://schemas.microsoft.com/office/drawing/2014/main" id="{3C53ABAA-35C8-1C55-5103-5598D0560EF0}"/>
+            </a:ext>
+          </a:extLst>
+        </p:cNvPr>
         <p:cNvGrpSpPr/>
         <p:nvPr/>
       </p:nvGrpSpPr>
@@ -6152,7 +6548,7 @@
           <p:cNvPr id="2" name="Titel 1">
             <a:extLst>
               <a:ext uri="{FF2B5EF4-FFF2-40B4-BE49-F238E27FC236}">
-                <a16:creationId xmlns:a16="http://schemas.microsoft.com/office/drawing/2014/main" id="{28107D28-FA76-389F-2BF1-8C8EDDD35D16}"/>
+                <a16:creationId xmlns:a16="http://schemas.microsoft.com/office/drawing/2014/main" id="{D7EDE1D7-476E-A345-B10B-86CA9AA3C3AB}"/>
               </a:ext>
             </a:extLst>
           </p:cNvPr>
@@ -6165,7 +6561,7 @@
         </p:nvSpPr>
         <p:spPr>
           <a:xfrm>
-            <a:off x="838200" y="500062"/>
+            <a:off x="838200" y="4883336"/>
             <a:ext cx="10515600" cy="1325563"/>
           </a:xfrm>
         </p:spPr>
@@ -6174,7 +6570,7 @@
           <a:lstStyle/>
           <a:p>
             <a:r>
-              <a:rPr lang="de-DE" dirty="0" err="1">
+              <a:rPr lang="de-DE" dirty="0">
                 <a:solidFill>
                   <a:schemeClr val="tx1">
                     <a:lumMod val="50000"/>
@@ -6182,10 +6578,10 @@
                   </a:schemeClr>
                 </a:solidFill>
               </a:rPr>
-              <a:t>How</a:t>
-            </a:r>
-            <a:r>
-              <a:rPr lang="de-DE" dirty="0">
+              <a:t>TO BE </a:t>
+            </a:r>
+            <a:r>
+              <a:rPr lang="de-DE" dirty="0" err="1">
                 <a:solidFill>
                   <a:schemeClr val="tx1">
                     <a:lumMod val="50000"/>
@@ -6193,62 +6589,7 @@
                   </a:schemeClr>
                 </a:solidFill>
               </a:rPr>
-              <a:t> </a:t>
-            </a:r>
-            <a:r>
-              <a:rPr lang="de-DE" dirty="0" err="1">
-                <a:solidFill>
-                  <a:schemeClr val="tx1">
-                    <a:lumMod val="50000"/>
-                    <a:lumOff val="50000"/>
-                  </a:schemeClr>
-                </a:solidFill>
-              </a:rPr>
-              <a:t>to</a:t>
-            </a:r>
-            <a:r>
-              <a:rPr lang="de-DE" dirty="0">
-                <a:solidFill>
-                  <a:schemeClr val="tx1">
-                    <a:lumMod val="50000"/>
-                    <a:lumOff val="50000"/>
-                  </a:schemeClr>
-                </a:solidFill>
-              </a:rPr>
-              <a:t> </a:t>
-            </a:r>
-            <a:r>
-              <a:rPr lang="de-DE" dirty="0" err="1">
-                <a:solidFill>
-                  <a:schemeClr val="tx1">
-                    <a:lumMod val="50000"/>
-                    <a:lumOff val="50000"/>
-                  </a:schemeClr>
-                </a:solidFill>
-              </a:rPr>
-              <a:t>implement</a:t>
-            </a:r>
-            <a:r>
-              <a:rPr lang="de-DE" dirty="0">
-                <a:solidFill>
-                  <a:schemeClr val="tx1">
-                    <a:lumMod val="50000"/>
-                    <a:lumOff val="50000"/>
-                  </a:schemeClr>
-                </a:solidFill>
-              </a:rPr>
-              <a:t> </a:t>
-            </a:r>
-            <a:r>
-              <a:rPr lang="de-DE" dirty="0" err="1">
-                <a:solidFill>
-                  <a:schemeClr val="tx1">
-                    <a:lumMod val="50000"/>
-                    <a:lumOff val="50000"/>
-                  </a:schemeClr>
-                </a:solidFill>
-              </a:rPr>
-              <a:t>Narcovet</a:t>
+              <a:t>Process</a:t>
             </a:r>
             <a:endParaRPr lang="de-DE" dirty="0">
               <a:solidFill>
@@ -6261,40 +6602,70 @@
           </a:p>
         </p:txBody>
       </p:sp>
-      <p:sp>
-        <p:nvSpPr>
-          <p:cNvPr id="3" name="Inhaltsplatzhalter 2">
-            <a:extLst>
-              <a:ext uri="{FF2B5EF4-FFF2-40B4-BE49-F238E27FC236}">
-                <a16:creationId xmlns:a16="http://schemas.microsoft.com/office/drawing/2014/main" id="{8CC658FB-A13A-CC0D-F682-EBE199A97437}"/>
-              </a:ext>
-            </a:extLst>
-          </p:cNvPr>
-          <p:cNvSpPr>
-            <a:spLocks noGrp="1"/>
-          </p:cNvSpPr>
-          <p:nvPr>
-            <p:ph idx="1"/>
-          </p:nvPr>
-        </p:nvSpPr>
+      <p:pic>
+        <p:nvPicPr>
+          <p:cNvPr id="5" name="Grafik 4">
+            <a:extLst>
+              <a:ext uri="{FF2B5EF4-FFF2-40B4-BE49-F238E27FC236}">
+                <a16:creationId xmlns:a16="http://schemas.microsoft.com/office/drawing/2014/main" id="{246CBE98-B6CB-CF9E-C6B6-52A6DE5558C9}"/>
+              </a:ext>
+            </a:extLst>
+          </p:cNvPr>
+          <p:cNvPicPr>
+            <a:picLocks noChangeAspect="1"/>
+          </p:cNvPicPr>
+          <p:nvPr/>
+        </p:nvPicPr>
+        <p:blipFill>
+          <a:blip r:embed="rId2"/>
+          <a:stretch>
+            <a:fillRect/>
+          </a:stretch>
+        </p:blipFill>
         <p:spPr>
           <a:xfrm>
-            <a:off x="838200" y="2006600"/>
-            <a:ext cx="10515600" cy="4351338"/>
+            <a:off x="249381" y="649101"/>
+            <a:ext cx="4322619" cy="3252880"/>
           </a:xfrm>
+          <a:prstGeom prst="rect">
+            <a:avLst/>
+          </a:prstGeom>
         </p:spPr>
-        <p:txBody>
-          <a:bodyPr/>
-          <a:lstStyle/>
-          <a:p>
-            <a:endParaRPr lang="de-DE" dirty="0"/>
-          </a:p>
-        </p:txBody>
-      </p:sp>
+      </p:pic>
+      <p:pic>
+        <p:nvPicPr>
+          <p:cNvPr id="7" name="Grafik 6">
+            <a:extLst>
+              <a:ext uri="{FF2B5EF4-FFF2-40B4-BE49-F238E27FC236}">
+                <a16:creationId xmlns:a16="http://schemas.microsoft.com/office/drawing/2014/main" id="{799A162E-E863-6CAD-7358-D7CA6E2354D6}"/>
+              </a:ext>
+            </a:extLst>
+          </p:cNvPr>
+          <p:cNvPicPr>
+            <a:picLocks noChangeAspect="1"/>
+          </p:cNvPicPr>
+          <p:nvPr/>
+        </p:nvPicPr>
+        <p:blipFill>
+          <a:blip r:embed="rId3"/>
+          <a:stretch>
+            <a:fillRect/>
+          </a:stretch>
+        </p:blipFill>
+        <p:spPr>
+          <a:xfrm>
+            <a:off x="5798126" y="649101"/>
+            <a:ext cx="4692518" cy="3644863"/>
+          </a:xfrm>
+          <a:prstGeom prst="rect">
+            <a:avLst/>
+          </a:prstGeom>
+        </p:spPr>
+      </p:pic>
     </p:spTree>
     <p:extLst>
       <p:ext uri="{BB962C8B-B14F-4D97-AF65-F5344CB8AC3E}">
-        <p14:creationId xmlns:p14="http://schemas.microsoft.com/office/powerpoint/2010/main" val="3941973886"/>
+        <p14:creationId xmlns:p14="http://schemas.microsoft.com/office/powerpoint/2010/main" val="3861457530"/>
       </p:ext>
     </p:extLst>
   </p:cSld>
@@ -6326,7 +6697,7 @@
           <p:cNvPr id="2" name="Titel 1">
             <a:extLst>
               <a:ext uri="{FF2B5EF4-FFF2-40B4-BE49-F238E27FC236}">
-                <a16:creationId xmlns:a16="http://schemas.microsoft.com/office/drawing/2014/main" id="{2E49F884-6A40-EE2A-90B8-8C104D63DBF1}"/>
+                <a16:creationId xmlns:a16="http://schemas.microsoft.com/office/drawing/2014/main" id="{C77BCFB3-2ECD-706A-3128-06DCE4D8CA3C}"/>
               </a:ext>
             </a:extLst>
           </p:cNvPr>
@@ -6339,7 +6710,7 @@
         </p:nvSpPr>
         <p:spPr>
           <a:xfrm>
-            <a:off x="838200" y="501743"/>
+            <a:off x="841513" y="500062"/>
             <a:ext cx="10515600" cy="1325563"/>
           </a:xfrm>
         </p:spPr>
@@ -6356,12 +6727,71 @@
                   </a:schemeClr>
                 </a:solidFill>
               </a:rPr>
-              <a:t>Demonstration</a:t>
-            </a:r>
-            <a:r>
-              <a:rPr lang="de-DE" dirty="0"/>
-              <a:t> </a:t>
-            </a:r>
+              <a:t>The </a:t>
+            </a:r>
+            <a:r>
+              <a:rPr lang="de-DE" dirty="0" err="1">
+                <a:solidFill>
+                  <a:schemeClr val="tx1">
+                    <a:lumMod val="50000"/>
+                    <a:lumOff val="50000"/>
+                  </a:schemeClr>
+                </a:solidFill>
+              </a:rPr>
+              <a:t>solution</a:t>
+            </a:r>
+            <a:r>
+              <a:rPr lang="de-DE" dirty="0">
+                <a:solidFill>
+                  <a:schemeClr val="tx1">
+                    <a:lumMod val="50000"/>
+                    <a:lumOff val="50000"/>
+                  </a:schemeClr>
+                </a:solidFill>
+              </a:rPr>
+              <a:t> </a:t>
+            </a:r>
+            <a:r>
+              <a:rPr lang="de-DE" dirty="0" err="1">
+                <a:solidFill>
+                  <a:schemeClr val="tx1">
+                    <a:lumMod val="50000"/>
+                    <a:lumOff val="50000"/>
+                  </a:schemeClr>
+                </a:solidFill>
+              </a:rPr>
+              <a:t>we</a:t>
+            </a:r>
+            <a:r>
+              <a:rPr lang="de-DE" dirty="0">
+                <a:solidFill>
+                  <a:schemeClr val="tx1">
+                    <a:lumMod val="50000"/>
+                    <a:lumOff val="50000"/>
+                  </a:schemeClr>
+                </a:solidFill>
+              </a:rPr>
+              <a:t> </a:t>
+            </a:r>
+            <a:r>
+              <a:rPr lang="de-DE" dirty="0" err="1">
+                <a:solidFill>
+                  <a:schemeClr val="tx1">
+                    <a:lumMod val="50000"/>
+                    <a:lumOff val="50000"/>
+                  </a:schemeClr>
+                </a:solidFill>
+              </a:rPr>
+              <a:t>provide</a:t>
+            </a:r>
+            <a:endParaRPr lang="de-DE" dirty="0">
+              <a:solidFill>
+                <a:schemeClr val="tx1">
+                  <a:lumMod val="50000"/>
+                  <a:lumOff val="50000"/>
+                </a:schemeClr>
+              </a:solidFill>
+            </a:endParaRPr>
           </a:p>
         </p:txBody>
       </p:sp>
@@ -6370,7 +6800,7 @@
           <p:cNvPr id="3" name="Inhaltsplatzhalter 2">
             <a:extLst>
               <a:ext uri="{FF2B5EF4-FFF2-40B4-BE49-F238E27FC236}">
-                <a16:creationId xmlns:a16="http://schemas.microsoft.com/office/drawing/2014/main" id="{306985A2-0C8B-1392-6737-3420007893C9}"/>
+                <a16:creationId xmlns:a16="http://schemas.microsoft.com/office/drawing/2014/main" id="{B4F46ABD-8990-3714-E9FF-EE7A6C6357C4}"/>
               </a:ext>
             </a:extLst>
           </p:cNvPr>
@@ -6383,17 +6813,259 @@
         </p:nvSpPr>
         <p:spPr>
           <a:xfrm>
-            <a:off x="838200" y="2004919"/>
+            <a:off x="841513" y="2006600"/>
             <a:ext cx="10515600" cy="4351338"/>
           </a:xfrm>
         </p:spPr>
         <p:txBody>
-          <a:bodyPr/>
+          <a:bodyPr>
+            <a:normAutofit lnSpcReduction="10000"/>
+          </a:bodyPr>
           <a:lstStyle/>
           <a:p>
             <a:r>
-              <a:rPr lang="de-DE" dirty="0"/>
-              <a:t>Video einfügen </a:t>
+              <a:rPr lang="de-DE" dirty="0" err="1"/>
+              <a:t>talking</a:t>
+            </a:r>
+            <a:r>
+              <a:rPr lang="de-DE" dirty="0"/>
+              <a:t> </a:t>
+            </a:r>
+            <a:r>
+              <a:rPr lang="de-DE" dirty="0" err="1"/>
+              <a:t>about</a:t>
+            </a:r>
+            <a:r>
+              <a:rPr lang="de-DE" dirty="0"/>
+              <a:t> </a:t>
+            </a:r>
+            <a:r>
+              <a:rPr lang="de-DE" dirty="0" err="1"/>
+              <a:t>technical</a:t>
+            </a:r>
+            <a:r>
+              <a:rPr lang="de-DE" dirty="0"/>
+              <a:t> </a:t>
+            </a:r>
+            <a:r>
+              <a:rPr lang="de-DE" dirty="0" err="1"/>
+              <a:t>details</a:t>
+            </a:r>
+            <a:endParaRPr lang="de-DE" dirty="0"/>
+          </a:p>
+          <a:p>
+            <a:r>
+              <a:rPr lang="de-DE" dirty="0"/>
+              <a:t>Automation:</a:t>
+            </a:r>
+          </a:p>
+          <a:p>
+            <a:pPr lvl="1"/>
+            <a:r>
+              <a:rPr lang="de-DE" dirty="0"/>
+              <a:t> </a:t>
+            </a:r>
+            <a:r>
+              <a:rPr lang="de-DE" dirty="0" err="1"/>
+              <a:t>inventory</a:t>
+            </a:r>
+            <a:r>
+              <a:rPr lang="de-DE" dirty="0"/>
+              <a:t> </a:t>
+            </a:r>
+            <a:r>
+              <a:rPr lang="de-DE" dirty="0" err="1"/>
+              <a:t>is</a:t>
+            </a:r>
+            <a:r>
+              <a:rPr lang="de-DE" dirty="0"/>
+              <a:t> </a:t>
+            </a:r>
+            <a:r>
+              <a:rPr lang="de-DE" dirty="0" err="1"/>
+              <a:t>checked</a:t>
+            </a:r>
+            <a:r>
+              <a:rPr lang="de-DE" dirty="0"/>
+              <a:t> </a:t>
+            </a:r>
+            <a:r>
+              <a:rPr lang="de-DE" dirty="0" err="1"/>
+              <a:t>as</a:t>
+            </a:r>
+            <a:r>
+              <a:rPr lang="de-DE" dirty="0"/>
+              <a:t> time </a:t>
+            </a:r>
+            <a:r>
+              <a:rPr lang="de-DE" dirty="0" err="1"/>
+              <a:t>event</a:t>
+            </a:r>
+            <a:r>
+              <a:rPr lang="de-DE" dirty="0"/>
+              <a:t> </a:t>
+            </a:r>
+            <a:r>
+              <a:rPr lang="de-DE" dirty="0" err="1"/>
+              <a:t>automatically</a:t>
+            </a:r>
+            <a:endParaRPr lang="de-DE" dirty="0"/>
+          </a:p>
+          <a:p>
+            <a:pPr lvl="2"/>
+            <a:r>
+              <a:rPr lang="de-DE" dirty="0"/>
+              <a:t>Returns </a:t>
+            </a:r>
+            <a:r>
+              <a:rPr lang="de-DE" dirty="0" err="1"/>
+              <a:t>if</a:t>
+            </a:r>
+            <a:r>
+              <a:rPr lang="de-DE" dirty="0"/>
+              <a:t> </a:t>
+            </a:r>
+            <a:r>
+              <a:rPr lang="de-DE" dirty="0" err="1"/>
+              <a:t>threshold</a:t>
+            </a:r>
+            <a:r>
+              <a:rPr lang="de-DE" dirty="0"/>
+              <a:t> </a:t>
+            </a:r>
+            <a:r>
+              <a:rPr lang="de-DE" dirty="0" err="1"/>
+              <a:t>is</a:t>
+            </a:r>
+            <a:r>
+              <a:rPr lang="de-DE" dirty="0"/>
+              <a:t> </a:t>
+            </a:r>
+            <a:r>
+              <a:rPr lang="de-DE" dirty="0" err="1"/>
+              <a:t>under</a:t>
+            </a:r>
+            <a:r>
+              <a:rPr lang="de-DE" dirty="0"/>
+              <a:t> </a:t>
+            </a:r>
+            <a:r>
+              <a:rPr lang="de-DE" dirty="0" err="1"/>
+              <a:t>orover</a:t>
+            </a:r>
+            <a:r>
+              <a:rPr lang="de-DE" dirty="0"/>
+              <a:t> </a:t>
+            </a:r>
+            <a:r>
+              <a:rPr lang="de-DE" dirty="0" err="1"/>
+              <a:t>limit</a:t>
+            </a:r>
+            <a:r>
+              <a:rPr lang="de-DE" dirty="0"/>
+              <a:t> </a:t>
+            </a:r>
+          </a:p>
+          <a:p>
+            <a:pPr lvl="1"/>
+            <a:r>
+              <a:rPr lang="de-DE" dirty="0" err="1"/>
+              <a:t>placeholder</a:t>
+            </a:r>
+            <a:endParaRPr lang="de-DE" dirty="0"/>
+          </a:p>
+          <a:p>
+            <a:pPr marL="0" indent="0">
+              <a:buNone/>
+            </a:pPr>
+            <a:endParaRPr lang="de-DE" dirty="0"/>
+          </a:p>
+          <a:p>
+            <a:r>
+              <a:rPr lang="de-DE" dirty="0" err="1"/>
+              <a:t>Unification</a:t>
+            </a:r>
+            <a:r>
+              <a:rPr lang="de-DE" dirty="0"/>
+              <a:t>: </a:t>
+            </a:r>
+          </a:p>
+          <a:p>
+            <a:r>
+              <a:rPr lang="de-DE" dirty="0" err="1"/>
+              <a:t>Decision</a:t>
+            </a:r>
+            <a:r>
+              <a:rPr lang="de-DE" dirty="0"/>
+              <a:t> support: </a:t>
+            </a:r>
+          </a:p>
+          <a:p>
+            <a:r>
+              <a:rPr lang="de-DE" dirty="0"/>
+              <a:t> </a:t>
+            </a:r>
+            <a:r>
+              <a:rPr lang="de-DE" dirty="0" err="1"/>
+              <a:t>use</a:t>
+            </a:r>
+            <a:r>
+              <a:rPr lang="de-DE" dirty="0"/>
+              <a:t> </a:t>
+            </a:r>
+            <a:r>
+              <a:rPr lang="de-DE" dirty="0" err="1"/>
+              <a:t>of</a:t>
+            </a:r>
+            <a:r>
+              <a:rPr lang="de-DE" dirty="0"/>
+              <a:t> </a:t>
+            </a:r>
+            <a:r>
+              <a:rPr lang="de-DE" dirty="0" err="1"/>
+              <a:t>Camunda</a:t>
+            </a:r>
+            <a:r>
+              <a:rPr lang="de-DE" dirty="0"/>
+              <a:t>, Python, </a:t>
+            </a:r>
+          </a:p>
+          <a:p>
+            <a:r>
+              <a:rPr lang="de-DE" dirty="0"/>
+              <a:t>Multiple </a:t>
+            </a:r>
+            <a:r>
+              <a:rPr lang="de-DE" dirty="0" err="1"/>
+              <a:t>service</a:t>
+            </a:r>
+            <a:r>
+              <a:rPr lang="de-DE" dirty="0"/>
+              <a:t> </a:t>
+            </a:r>
+            <a:r>
+              <a:rPr lang="de-DE" dirty="0" err="1"/>
+              <a:t>tasks</a:t>
+            </a:r>
+            <a:r>
+              <a:rPr lang="de-DE" dirty="0"/>
+              <a:t>, </a:t>
+            </a:r>
+            <a:r>
+              <a:rPr lang="de-DE" dirty="0" err="1"/>
+              <a:t>Decision</a:t>
+            </a:r>
+            <a:r>
+              <a:rPr lang="de-DE" dirty="0"/>
+              <a:t> </a:t>
+            </a:r>
+            <a:r>
+              <a:rPr lang="de-DE" dirty="0" err="1"/>
+              <a:t>modeling</a:t>
+            </a:r>
+            <a:r>
+              <a:rPr lang="de-DE" dirty="0"/>
+              <a:t> </a:t>
             </a:r>
           </a:p>
         </p:txBody>
@@ -6401,7 +7073,7 @@
     </p:spTree>
     <p:extLst>
       <p:ext uri="{BB962C8B-B14F-4D97-AF65-F5344CB8AC3E}">
-        <p14:creationId xmlns:p14="http://schemas.microsoft.com/office/powerpoint/2010/main" val="1146317798"/>
+        <p14:creationId xmlns:p14="http://schemas.microsoft.com/office/powerpoint/2010/main" val="1415540745"/>
       </p:ext>
     </p:extLst>
   </p:cSld>
@@ -6433,7 +7105,7 @@
           <p:cNvPr id="2" name="Titel 1">
             <a:extLst>
               <a:ext uri="{FF2B5EF4-FFF2-40B4-BE49-F238E27FC236}">
-                <a16:creationId xmlns:a16="http://schemas.microsoft.com/office/drawing/2014/main" id="{22D8ECC0-E8B5-00F4-CDAC-994AFC71E380}"/>
+                <a16:creationId xmlns:a16="http://schemas.microsoft.com/office/drawing/2014/main" id="{28107D28-FA76-389F-2BF1-8C8EDDD35D16}"/>
               </a:ext>
             </a:extLst>
           </p:cNvPr>
@@ -6446,7 +7118,7 @@
         </p:nvSpPr>
         <p:spPr>
           <a:xfrm>
-            <a:off x="838200" y="4872958"/>
+            <a:off x="838200" y="500062"/>
             <a:ext cx="10515600" cy="1325563"/>
           </a:xfrm>
         </p:spPr>
@@ -6455,7 +7127,7 @@
           <a:lstStyle/>
           <a:p>
             <a:r>
-              <a:rPr lang="de-DE" dirty="0">
+              <a:rPr lang="de-DE" dirty="0" err="1">
                 <a:solidFill>
                   <a:schemeClr val="tx1">
                     <a:lumMod val="50000"/>
@@ -6463,427 +7135,119 @@
                   </a:schemeClr>
                 </a:solidFill>
               </a:rPr>
-              <a:t>Benefits</a:t>
-            </a:r>
-          </a:p>
-        </p:txBody>
-      </p:sp>
-      <p:sp>
-        <p:nvSpPr>
-          <p:cNvPr id="4" name="Textfeld 3">
-            <a:extLst>
-              <a:ext uri="{FF2B5EF4-FFF2-40B4-BE49-F238E27FC236}">
-                <a16:creationId xmlns:a16="http://schemas.microsoft.com/office/drawing/2014/main" id="{65756FEC-7821-2152-6E2C-7D131DA37680}"/>
-              </a:ext>
-            </a:extLst>
-          </p:cNvPr>
-          <p:cNvSpPr txBox="1"/>
-          <p:nvPr/>
+              <a:t>How</a:t>
+            </a:r>
+            <a:r>
+              <a:rPr lang="de-DE" dirty="0">
+                <a:solidFill>
+                  <a:schemeClr val="tx1">
+                    <a:lumMod val="50000"/>
+                    <a:lumOff val="50000"/>
+                  </a:schemeClr>
+                </a:solidFill>
+              </a:rPr>
+              <a:t> </a:t>
+            </a:r>
+            <a:r>
+              <a:rPr lang="de-DE" dirty="0" err="1">
+                <a:solidFill>
+                  <a:schemeClr val="tx1">
+                    <a:lumMod val="50000"/>
+                    <a:lumOff val="50000"/>
+                  </a:schemeClr>
+                </a:solidFill>
+              </a:rPr>
+              <a:t>to</a:t>
+            </a:r>
+            <a:r>
+              <a:rPr lang="de-DE" dirty="0">
+                <a:solidFill>
+                  <a:schemeClr val="tx1">
+                    <a:lumMod val="50000"/>
+                    <a:lumOff val="50000"/>
+                  </a:schemeClr>
+                </a:solidFill>
+              </a:rPr>
+              <a:t> </a:t>
+            </a:r>
+            <a:r>
+              <a:rPr lang="de-DE" dirty="0" err="1">
+                <a:solidFill>
+                  <a:schemeClr val="tx1">
+                    <a:lumMod val="50000"/>
+                    <a:lumOff val="50000"/>
+                  </a:schemeClr>
+                </a:solidFill>
+              </a:rPr>
+              <a:t>implement</a:t>
+            </a:r>
+            <a:r>
+              <a:rPr lang="de-DE" dirty="0">
+                <a:solidFill>
+                  <a:schemeClr val="tx1">
+                    <a:lumMod val="50000"/>
+                    <a:lumOff val="50000"/>
+                  </a:schemeClr>
+                </a:solidFill>
+              </a:rPr>
+              <a:t> </a:t>
+            </a:r>
+            <a:r>
+              <a:rPr lang="de-DE" dirty="0" err="1">
+                <a:solidFill>
+                  <a:schemeClr val="tx1">
+                    <a:lumMod val="50000"/>
+                    <a:lumOff val="50000"/>
+                  </a:schemeClr>
+                </a:solidFill>
+              </a:rPr>
+              <a:t>Narcovet</a:t>
+            </a:r>
+            <a:endParaRPr lang="de-DE" dirty="0">
+              <a:solidFill>
+                <a:schemeClr val="tx1">
+                  <a:lumMod val="50000"/>
+                  <a:lumOff val="50000"/>
+                </a:schemeClr>
+              </a:solidFill>
+            </a:endParaRPr>
+          </a:p>
+        </p:txBody>
+      </p:sp>
+      <p:sp>
+        <p:nvSpPr>
+          <p:cNvPr id="3" name="Inhaltsplatzhalter 2">
+            <a:extLst>
+              <a:ext uri="{FF2B5EF4-FFF2-40B4-BE49-F238E27FC236}">
+                <a16:creationId xmlns:a16="http://schemas.microsoft.com/office/drawing/2014/main" id="{8CC658FB-A13A-CC0D-F682-EBE199A97437}"/>
+              </a:ext>
+            </a:extLst>
+          </p:cNvPr>
+          <p:cNvSpPr>
+            <a:spLocks noGrp="1"/>
+          </p:cNvSpPr>
+          <p:nvPr>
+            <p:ph idx="1"/>
+          </p:nvPr>
         </p:nvSpPr>
         <p:spPr>
           <a:xfrm>
-            <a:off x="838200" y="659479"/>
-            <a:ext cx="9403080" cy="3139321"/>
+            <a:off x="838200" y="2006600"/>
+            <a:ext cx="10515600" cy="4351338"/>
           </a:xfrm>
-          <a:prstGeom prst="rect">
-            <a:avLst/>
-          </a:prstGeom>
-          <a:noFill/>
         </p:spPr>
         <p:txBody>
-          <a:bodyPr wrap="square" rtlCol="0">
-            <a:spAutoFit/>
-          </a:bodyPr>
+          <a:bodyPr/>
           <a:lstStyle/>
           <a:p>
-            <a:r>
-              <a:rPr lang="de-DE" dirty="0" err="1"/>
-              <a:t>Reduction</a:t>
-            </a:r>
-            <a:r>
-              <a:rPr lang="de-DE" dirty="0"/>
-              <a:t> </a:t>
-            </a:r>
-            <a:r>
-              <a:rPr lang="de-DE" dirty="0" err="1"/>
-              <a:t>of</a:t>
-            </a:r>
-            <a:r>
-              <a:rPr lang="de-DE" dirty="0"/>
-              <a:t> </a:t>
-            </a:r>
-            <a:r>
-              <a:rPr lang="de-DE" dirty="0" err="1"/>
-              <a:t>hours</a:t>
-            </a:r>
-            <a:r>
-              <a:rPr lang="de-DE" dirty="0"/>
-              <a:t> </a:t>
-            </a:r>
-            <a:r>
-              <a:rPr lang="de-DE" dirty="0" err="1"/>
-              <a:t>spent</a:t>
-            </a:r>
-            <a:r>
-              <a:rPr lang="de-DE" dirty="0"/>
-              <a:t> on </a:t>
-            </a:r>
-            <a:r>
-              <a:rPr lang="de-DE" dirty="0" err="1"/>
-              <a:t>narcotics</a:t>
-            </a:r>
-            <a:r>
-              <a:rPr lang="de-DE" dirty="0"/>
-              <a:t> </a:t>
-            </a:r>
-            <a:r>
-              <a:rPr lang="de-DE" dirty="0" err="1"/>
-              <a:t>management</a:t>
-            </a:r>
-            <a:r>
-              <a:rPr lang="de-DE" dirty="0"/>
-              <a:t> </a:t>
-            </a:r>
-            <a:r>
-              <a:rPr lang="de-DE" dirty="0" err="1"/>
-              <a:t>reduced</a:t>
-            </a:r>
-            <a:r>
-              <a:rPr lang="de-DE" dirty="0"/>
-              <a:t> </a:t>
-            </a:r>
-            <a:r>
-              <a:rPr lang="de-DE" dirty="0" err="1"/>
-              <a:t>by</a:t>
-            </a:r>
-            <a:r>
-              <a:rPr lang="de-DE" dirty="0"/>
-              <a:t> </a:t>
-            </a:r>
-            <a:r>
-              <a:rPr lang="de-DE" dirty="0" err="1"/>
-              <a:t>estimated</a:t>
-            </a:r>
-            <a:r>
-              <a:rPr lang="de-DE" dirty="0"/>
-              <a:t>: </a:t>
-            </a:r>
-          </a:p>
-          <a:p>
-            <a:r>
-              <a:rPr lang="de-DE" dirty="0"/>
-              <a:t>180h per </a:t>
-            </a:r>
-            <a:r>
-              <a:rPr lang="de-DE" dirty="0" err="1"/>
-              <a:t>year</a:t>
-            </a:r>
-            <a:r>
-              <a:rPr lang="de-DE" dirty="0"/>
-              <a:t> </a:t>
-            </a:r>
-            <a:r>
-              <a:rPr lang="de-DE" dirty="0" err="1"/>
-              <a:t>without</a:t>
-            </a:r>
-            <a:r>
-              <a:rPr lang="de-DE" dirty="0"/>
-              <a:t> </a:t>
-            </a:r>
-            <a:r>
-              <a:rPr lang="de-DE" dirty="0" err="1"/>
-              <a:t>Narcovets</a:t>
-            </a:r>
-            <a:r>
-              <a:rPr lang="de-DE" dirty="0"/>
-              <a:t> </a:t>
-            </a:r>
-          </a:p>
-          <a:p>
-            <a:r>
-              <a:rPr lang="de-DE" dirty="0"/>
-              <a:t>67h per </a:t>
-            </a:r>
-            <a:r>
-              <a:rPr lang="de-DE" dirty="0" err="1"/>
-              <a:t>year</a:t>
-            </a:r>
-            <a:r>
-              <a:rPr lang="de-DE" dirty="0"/>
-              <a:t> </a:t>
-            </a:r>
-            <a:r>
-              <a:rPr lang="de-DE" dirty="0" err="1"/>
-              <a:t>with</a:t>
-            </a:r>
-            <a:r>
-              <a:rPr lang="de-DE" dirty="0"/>
-              <a:t> </a:t>
-            </a:r>
-            <a:r>
-              <a:rPr lang="de-DE" dirty="0" err="1"/>
-              <a:t>Narcovets</a:t>
-            </a:r>
-            <a:r>
-              <a:rPr lang="de-DE" dirty="0"/>
-              <a:t> </a:t>
-            </a:r>
-          </a:p>
-          <a:p>
-            <a:r>
-              <a:rPr lang="de-DE" dirty="0"/>
-              <a:t> </a:t>
-            </a:r>
-          </a:p>
-          <a:p>
-            <a:r>
-              <a:rPr lang="de-DE" dirty="0" err="1"/>
-              <a:t>Reduction</a:t>
-            </a:r>
-            <a:r>
-              <a:rPr lang="de-DE" dirty="0"/>
-              <a:t> on </a:t>
-            </a:r>
-            <a:r>
-              <a:rPr lang="de-DE" dirty="0" err="1"/>
-              <a:t>money</a:t>
-            </a:r>
-            <a:r>
-              <a:rPr lang="de-DE" dirty="0"/>
-              <a:t> </a:t>
-            </a:r>
-            <a:r>
-              <a:rPr lang="de-DE" dirty="0" err="1"/>
-              <a:t>spent</a:t>
-            </a:r>
-            <a:r>
-              <a:rPr lang="de-DE" dirty="0"/>
-              <a:t> on </a:t>
-            </a:r>
-            <a:r>
-              <a:rPr lang="de-DE" dirty="0" err="1"/>
-              <a:t>narcotics</a:t>
-            </a:r>
-            <a:r>
-              <a:rPr lang="de-DE" dirty="0"/>
-              <a:t> </a:t>
-            </a:r>
-            <a:r>
-              <a:rPr lang="de-DE" dirty="0" err="1"/>
-              <a:t>management</a:t>
-            </a:r>
-            <a:r>
-              <a:rPr lang="de-DE" dirty="0"/>
-              <a:t> </a:t>
-            </a:r>
-            <a:r>
-              <a:rPr lang="de-DE" dirty="0" err="1"/>
-              <a:t>reduced</a:t>
-            </a:r>
-            <a:r>
-              <a:rPr lang="de-DE" dirty="0"/>
-              <a:t> </a:t>
-            </a:r>
-            <a:r>
-              <a:rPr lang="de-DE" dirty="0" err="1"/>
-              <a:t>by</a:t>
-            </a:r>
-            <a:r>
-              <a:rPr lang="de-DE" dirty="0"/>
-              <a:t> </a:t>
-            </a:r>
-            <a:r>
-              <a:rPr lang="de-DE" dirty="0" err="1"/>
-              <a:t>estimated</a:t>
-            </a:r>
-            <a:r>
-              <a:rPr lang="de-DE" dirty="0"/>
-              <a:t>:</a:t>
-            </a:r>
-          </a:p>
-          <a:p>
-            <a:r>
-              <a:rPr lang="de-DE" dirty="0"/>
-              <a:t>10.000CHF per </a:t>
-            </a:r>
-            <a:r>
-              <a:rPr lang="de-DE" dirty="0" err="1"/>
-              <a:t>year</a:t>
-            </a:r>
-            <a:r>
-              <a:rPr lang="de-DE" dirty="0"/>
-              <a:t> </a:t>
-            </a:r>
-            <a:r>
-              <a:rPr lang="de-DE" dirty="0" err="1"/>
-              <a:t>without</a:t>
-            </a:r>
-            <a:r>
-              <a:rPr lang="de-DE" dirty="0"/>
-              <a:t> </a:t>
-            </a:r>
-            <a:r>
-              <a:rPr lang="de-DE" dirty="0" err="1"/>
-              <a:t>Narcovets</a:t>
-            </a:r>
-            <a:r>
-              <a:rPr lang="de-DE" dirty="0"/>
-              <a:t> </a:t>
-            </a:r>
-          </a:p>
-          <a:p>
-            <a:r>
-              <a:rPr lang="de-DE" dirty="0"/>
-              <a:t> 5.000CHF per </a:t>
-            </a:r>
-            <a:r>
-              <a:rPr lang="de-DE" dirty="0" err="1"/>
-              <a:t>year</a:t>
-            </a:r>
-            <a:r>
-              <a:rPr lang="de-DE" dirty="0"/>
-              <a:t> </a:t>
-            </a:r>
-            <a:r>
-              <a:rPr lang="de-DE" dirty="0" err="1"/>
-              <a:t>with</a:t>
-            </a:r>
-            <a:r>
-              <a:rPr lang="de-DE" dirty="0"/>
-              <a:t> </a:t>
-            </a:r>
-            <a:r>
-              <a:rPr lang="de-DE" dirty="0" err="1"/>
-              <a:t>Narcovets</a:t>
-            </a:r>
-            <a:r>
-              <a:rPr lang="de-DE" dirty="0"/>
-              <a:t> </a:t>
-            </a:r>
-          </a:p>
-          <a:p>
             <a:endParaRPr lang="de-DE" dirty="0"/>
-          </a:p>
-          <a:p>
-            <a:r>
-              <a:rPr lang="de-DE" dirty="0"/>
-              <a:t>On top: </a:t>
-            </a:r>
-          </a:p>
-          <a:p>
-            <a:pPr marL="285750" indent="-285750">
-              <a:buFontTx/>
-              <a:buChar char="-"/>
-            </a:pPr>
-            <a:r>
-              <a:rPr lang="de-DE" dirty="0" err="1"/>
-              <a:t>Centralized</a:t>
-            </a:r>
-            <a:r>
-              <a:rPr lang="de-DE" dirty="0"/>
-              <a:t> </a:t>
-            </a:r>
-            <a:r>
-              <a:rPr lang="de-DE" dirty="0" err="1"/>
-              <a:t>documentation</a:t>
-            </a:r>
-            <a:r>
-              <a:rPr lang="de-DE" dirty="0"/>
-              <a:t> </a:t>
-            </a:r>
-          </a:p>
-          <a:p>
-            <a:pPr marL="285750" indent="-285750">
-              <a:buFontTx/>
-              <a:buChar char="-"/>
-            </a:pPr>
-            <a:r>
-              <a:rPr lang="de-DE" dirty="0" err="1"/>
-              <a:t>Less</a:t>
-            </a:r>
-            <a:r>
-              <a:rPr lang="de-DE" dirty="0"/>
-              <a:t> </a:t>
-            </a:r>
-            <a:r>
-              <a:rPr lang="de-DE" dirty="0" err="1"/>
-              <a:t>risk</a:t>
-            </a:r>
-            <a:r>
-              <a:rPr lang="de-DE" dirty="0"/>
-              <a:t> </a:t>
-            </a:r>
-            <a:r>
-              <a:rPr lang="de-DE" dirty="0" err="1"/>
-              <a:t>for</a:t>
-            </a:r>
-            <a:r>
-              <a:rPr lang="de-DE" dirty="0"/>
-              <a:t> human </a:t>
-            </a:r>
-            <a:r>
-              <a:rPr lang="de-DE" dirty="0" err="1"/>
-              <a:t>errors</a:t>
-            </a:r>
-            <a:r>
-              <a:rPr lang="de-DE" dirty="0"/>
-              <a:t> </a:t>
-            </a:r>
-            <a:r>
-              <a:rPr lang="de-DE" dirty="0" err="1"/>
-              <a:t>or</a:t>
-            </a:r>
-            <a:r>
-              <a:rPr lang="de-DE" dirty="0"/>
-              <a:t> human </a:t>
-            </a:r>
-            <a:r>
-              <a:rPr lang="de-DE" dirty="0" err="1"/>
-              <a:t>intervention</a:t>
-            </a:r>
-            <a:r>
-              <a:rPr lang="de-DE" dirty="0"/>
-              <a:t> </a:t>
-            </a:r>
-            <a:r>
-              <a:rPr lang="de-DE" dirty="0" err="1"/>
-              <a:t>to</a:t>
-            </a:r>
-            <a:r>
-              <a:rPr lang="de-DE" dirty="0"/>
-              <a:t> </a:t>
-            </a:r>
-            <a:r>
-              <a:rPr lang="de-DE" dirty="0" err="1"/>
-              <a:t>cheat</a:t>
-            </a:r>
-            <a:r>
-              <a:rPr lang="de-DE" dirty="0"/>
-              <a:t> </a:t>
-            </a:r>
-            <a:r>
-              <a:rPr lang="de-DE" dirty="0" err="1"/>
-              <a:t>wrong</a:t>
-            </a:r>
-            <a:r>
-              <a:rPr lang="de-DE" dirty="0"/>
-              <a:t> </a:t>
-            </a:r>
-            <a:r>
-              <a:rPr lang="de-DE" dirty="0" err="1"/>
-              <a:t>numbers</a:t>
-            </a:r>
-            <a:r>
-              <a:rPr lang="de-DE" dirty="0"/>
-              <a:t> </a:t>
-            </a:r>
           </a:p>
         </p:txBody>
       </p:sp>
     </p:spTree>
     <p:extLst>
       <p:ext uri="{BB962C8B-B14F-4D97-AF65-F5344CB8AC3E}">
-        <p14:creationId xmlns:p14="http://schemas.microsoft.com/office/powerpoint/2010/main" val="4087394814"/>
+        <p14:creationId xmlns:p14="http://schemas.microsoft.com/office/powerpoint/2010/main" val="3941973886"/>
       </p:ext>
     </p:extLst>
   </p:cSld>

</xml_diff>

<commit_message>
added some finished slides
</commit_message>
<xml_diff>
--- a/presentation and documentation/Narcovet.pptx
+++ b/presentation and documentation/Narcovet.pptx
@@ -6,17 +6,15 @@
   </p:sldMasterIdLst>
   <p:sldIdLst>
     <p:sldId id="261" r:id="rId2"/>
-    <p:sldId id="257" r:id="rId3"/>
+    <p:sldId id="273" r:id="rId3"/>
     <p:sldId id="259" r:id="rId4"/>
     <p:sldId id="268" r:id="rId5"/>
-    <p:sldId id="260" r:id="rId6"/>
-    <p:sldId id="269" r:id="rId7"/>
-    <p:sldId id="270" r:id="rId8"/>
-    <p:sldId id="262" r:id="rId9"/>
-    <p:sldId id="266" r:id="rId10"/>
-    <p:sldId id="263" r:id="rId11"/>
-    <p:sldId id="267" r:id="rId12"/>
-    <p:sldId id="265" r:id="rId13"/>
+    <p:sldId id="269" r:id="rId6"/>
+    <p:sldId id="270" r:id="rId7"/>
+    <p:sldId id="262" r:id="rId8"/>
+    <p:sldId id="263" r:id="rId9"/>
+    <p:sldId id="272" r:id="rId10"/>
+    <p:sldId id="271" r:id="rId11"/>
   </p:sldIdLst>
   <p:sldSz cx="12192000" cy="6858000"/>
   <p:notesSz cx="6858000" cy="9144000"/>
@@ -352,7 +350,7 @@
           <a:p>
             <a:fld id="{8E7E68AA-B059-46D2-BC07-C1FC2D1B532B}" type="datetimeFigureOut">
               <a:rPr lang="de-DE" smtClean="0"/>
-              <a:t>18.12.2024</a:t>
+              <a:t>19.12.2024</a:t>
             </a:fld>
             <a:endParaRPr lang="de-DE"/>
           </a:p>
@@ -610,7 +608,7 @@
           <a:p>
             <a:fld id="{8E7E68AA-B059-46D2-BC07-C1FC2D1B532B}" type="datetimeFigureOut">
               <a:rPr lang="de-DE" smtClean="0"/>
-              <a:t>18.12.2024</a:t>
+              <a:t>19.12.2024</a:t>
             </a:fld>
             <a:endParaRPr lang="de-DE"/>
           </a:p>
@@ -885,7 +883,7 @@
           <a:p>
             <a:fld id="{8E7E68AA-B059-46D2-BC07-C1FC2D1B532B}" type="datetimeFigureOut">
               <a:rPr lang="de-DE" smtClean="0"/>
-              <a:t>18.12.2024</a:t>
+              <a:t>19.12.2024</a:t>
             </a:fld>
             <a:endParaRPr lang="de-DE"/>
           </a:p>
@@ -1234,7 +1232,7 @@
           <a:p>
             <a:fld id="{8E7E68AA-B059-46D2-BC07-C1FC2D1B532B}" type="datetimeFigureOut">
               <a:rPr lang="de-DE" smtClean="0"/>
-              <a:t>18.12.2024</a:t>
+              <a:t>19.12.2024</a:t>
             </a:fld>
             <a:endParaRPr lang="de-DE"/>
           </a:p>
@@ -1646,7 +1644,7 @@
           <a:p>
             <a:fld id="{8E7E68AA-B059-46D2-BC07-C1FC2D1B532B}" type="datetimeFigureOut">
               <a:rPr lang="de-DE" smtClean="0"/>
-              <a:t>18.12.2024</a:t>
+              <a:t>19.12.2024</a:t>
             </a:fld>
             <a:endParaRPr lang="de-DE"/>
           </a:p>
@@ -1787,7 +1785,7 @@
           <a:p>
             <a:fld id="{8E7E68AA-B059-46D2-BC07-C1FC2D1B532B}" type="datetimeFigureOut">
               <a:rPr lang="de-DE" smtClean="0"/>
-              <a:t>18.12.2024</a:t>
+              <a:t>19.12.2024</a:t>
             </a:fld>
             <a:endParaRPr lang="de-DE"/>
           </a:p>
@@ -1964,7 +1962,7 @@
           <a:p>
             <a:fld id="{8E7E68AA-B059-46D2-BC07-C1FC2D1B532B}" type="datetimeFigureOut">
               <a:rPr lang="de-DE" smtClean="0"/>
-              <a:t>18.12.2024</a:t>
+              <a:t>19.12.2024</a:t>
             </a:fld>
             <a:endParaRPr lang="de-DE"/>
           </a:p>
@@ -2335,7 +2333,7 @@
           <a:p>
             <a:fld id="{8E7E68AA-B059-46D2-BC07-C1FC2D1B532B}" type="datetimeFigureOut">
               <a:rPr lang="de-DE" smtClean="0"/>
-              <a:t>18.12.2024</a:t>
+              <a:t>19.12.2024</a:t>
             </a:fld>
             <a:endParaRPr lang="de-DE"/>
           </a:p>
@@ -2623,7 +2621,7 @@
           <a:p>
             <a:fld id="{8E7E68AA-B059-46D2-BC07-C1FC2D1B532B}" type="datetimeFigureOut">
               <a:rPr lang="de-DE" smtClean="0"/>
-              <a:t>18.12.2024</a:t>
+              <a:t>19.12.2024</a:t>
             </a:fld>
             <a:endParaRPr lang="de-DE"/>
           </a:p>
@@ -2864,7 +2862,7 @@
           <a:p>
             <a:fld id="{8E7E68AA-B059-46D2-BC07-C1FC2D1B532B}" type="datetimeFigureOut">
               <a:rPr lang="de-DE" smtClean="0"/>
-              <a:t>18.12.2024</a:t>
+              <a:t>19.12.2024</a:t>
             </a:fld>
             <a:endParaRPr lang="de-DE" dirty="0"/>
           </a:p>
@@ -3847,595 +3845,6 @@
       </p:grpSpPr>
       <p:sp>
         <p:nvSpPr>
-          <p:cNvPr id="2" name="Titel 1">
-            <a:extLst>
-              <a:ext uri="{FF2B5EF4-FFF2-40B4-BE49-F238E27FC236}">
-                <a16:creationId xmlns:a16="http://schemas.microsoft.com/office/drawing/2014/main" id="{2E49F884-6A40-EE2A-90B8-8C104D63DBF1}"/>
-              </a:ext>
-            </a:extLst>
-          </p:cNvPr>
-          <p:cNvSpPr>
-            <a:spLocks noGrp="1"/>
-          </p:cNvSpPr>
-          <p:nvPr>
-            <p:ph type="title"/>
-          </p:nvPr>
-        </p:nvSpPr>
-        <p:spPr>
-          <a:xfrm>
-            <a:off x="838200" y="501743"/>
-            <a:ext cx="10515600" cy="1325563"/>
-          </a:xfrm>
-        </p:spPr>
-        <p:txBody>
-          <a:bodyPr/>
-          <a:lstStyle/>
-          <a:p>
-            <a:r>
-              <a:rPr lang="de-DE" dirty="0">
-                <a:solidFill>
-                  <a:schemeClr val="tx1">
-                    <a:lumMod val="50000"/>
-                    <a:lumOff val="50000"/>
-                  </a:schemeClr>
-                </a:solidFill>
-              </a:rPr>
-              <a:t>Demonstration</a:t>
-            </a:r>
-            <a:r>
-              <a:rPr lang="de-DE" dirty="0"/>
-              <a:t> </a:t>
-            </a:r>
-          </a:p>
-        </p:txBody>
-      </p:sp>
-      <p:sp>
-        <p:nvSpPr>
-          <p:cNvPr id="3" name="Inhaltsplatzhalter 2">
-            <a:extLst>
-              <a:ext uri="{FF2B5EF4-FFF2-40B4-BE49-F238E27FC236}">
-                <a16:creationId xmlns:a16="http://schemas.microsoft.com/office/drawing/2014/main" id="{306985A2-0C8B-1392-6737-3420007893C9}"/>
-              </a:ext>
-            </a:extLst>
-          </p:cNvPr>
-          <p:cNvSpPr>
-            <a:spLocks noGrp="1"/>
-          </p:cNvSpPr>
-          <p:nvPr>
-            <p:ph idx="1"/>
-          </p:nvPr>
-        </p:nvSpPr>
-        <p:spPr>
-          <a:xfrm>
-            <a:off x="838200" y="2004919"/>
-            <a:ext cx="10515600" cy="4351338"/>
-          </a:xfrm>
-        </p:spPr>
-        <p:txBody>
-          <a:bodyPr/>
-          <a:lstStyle/>
-          <a:p>
-            <a:r>
-              <a:rPr lang="de-DE" dirty="0"/>
-              <a:t>Video einfügen </a:t>
-            </a:r>
-          </a:p>
-        </p:txBody>
-      </p:sp>
-    </p:spTree>
-    <p:extLst>
-      <p:ext uri="{BB962C8B-B14F-4D97-AF65-F5344CB8AC3E}">
-        <p14:creationId xmlns:p14="http://schemas.microsoft.com/office/powerpoint/2010/main" val="1146317798"/>
-      </p:ext>
-    </p:extLst>
-  </p:cSld>
-  <p:clrMapOvr>
-    <a:masterClrMapping/>
-  </p:clrMapOvr>
-</p:sld>
-</file>
-
-<file path=ppt/slides/slide11.xml><?xml version="1.0" encoding="utf-8"?>
-<p:sld xmlns:a="http://schemas.openxmlformats.org/drawingml/2006/main" xmlns:r="http://schemas.openxmlformats.org/officeDocument/2006/relationships" xmlns:p="http://schemas.openxmlformats.org/presentationml/2006/main">
-  <p:cSld>
-    <p:spTree>
-      <p:nvGrpSpPr>
-        <p:cNvPr id="1" name=""/>
-        <p:cNvGrpSpPr/>
-        <p:nvPr/>
-      </p:nvGrpSpPr>
-      <p:grpSpPr>
-        <a:xfrm>
-          <a:off x="0" y="0"/>
-          <a:ext cx="0" cy="0"/>
-          <a:chOff x="0" y="0"/>
-          <a:chExt cx="0" cy="0"/>
-        </a:xfrm>
-      </p:grpSpPr>
-      <p:sp>
-        <p:nvSpPr>
-          <p:cNvPr id="2" name="Titel 1">
-            <a:extLst>
-              <a:ext uri="{FF2B5EF4-FFF2-40B4-BE49-F238E27FC236}">
-                <a16:creationId xmlns:a16="http://schemas.microsoft.com/office/drawing/2014/main" id="{22D8ECC0-E8B5-00F4-CDAC-994AFC71E380}"/>
-              </a:ext>
-            </a:extLst>
-          </p:cNvPr>
-          <p:cNvSpPr>
-            <a:spLocks noGrp="1"/>
-          </p:cNvSpPr>
-          <p:nvPr>
-            <p:ph type="title"/>
-          </p:nvPr>
-        </p:nvSpPr>
-        <p:spPr>
-          <a:xfrm>
-            <a:off x="838200" y="4872958"/>
-            <a:ext cx="10515600" cy="1325563"/>
-          </a:xfrm>
-        </p:spPr>
-        <p:txBody>
-          <a:bodyPr/>
-          <a:lstStyle/>
-          <a:p>
-            <a:r>
-              <a:rPr lang="de-DE" dirty="0">
-                <a:solidFill>
-                  <a:schemeClr val="tx1">
-                    <a:lumMod val="50000"/>
-                    <a:lumOff val="50000"/>
-                  </a:schemeClr>
-                </a:solidFill>
-              </a:rPr>
-              <a:t>Benefits</a:t>
-            </a:r>
-          </a:p>
-        </p:txBody>
-      </p:sp>
-      <p:sp>
-        <p:nvSpPr>
-          <p:cNvPr id="4" name="Textfeld 3">
-            <a:extLst>
-              <a:ext uri="{FF2B5EF4-FFF2-40B4-BE49-F238E27FC236}">
-                <a16:creationId xmlns:a16="http://schemas.microsoft.com/office/drawing/2014/main" id="{65756FEC-7821-2152-6E2C-7D131DA37680}"/>
-              </a:ext>
-            </a:extLst>
-          </p:cNvPr>
-          <p:cNvSpPr txBox="1"/>
-          <p:nvPr/>
-        </p:nvSpPr>
-        <p:spPr>
-          <a:xfrm>
-            <a:off x="838200" y="659479"/>
-            <a:ext cx="9403080" cy="3139321"/>
-          </a:xfrm>
-          <a:prstGeom prst="rect">
-            <a:avLst/>
-          </a:prstGeom>
-          <a:noFill/>
-        </p:spPr>
-        <p:txBody>
-          <a:bodyPr wrap="square" rtlCol="0">
-            <a:spAutoFit/>
-          </a:bodyPr>
-          <a:lstStyle/>
-          <a:p>
-            <a:r>
-              <a:rPr lang="de-DE" dirty="0" err="1"/>
-              <a:t>Reduction</a:t>
-            </a:r>
-            <a:r>
-              <a:rPr lang="de-DE" dirty="0"/>
-              <a:t> </a:t>
-            </a:r>
-            <a:r>
-              <a:rPr lang="de-DE" dirty="0" err="1"/>
-              <a:t>of</a:t>
-            </a:r>
-            <a:r>
-              <a:rPr lang="de-DE" dirty="0"/>
-              <a:t> </a:t>
-            </a:r>
-            <a:r>
-              <a:rPr lang="de-DE" dirty="0" err="1"/>
-              <a:t>hours</a:t>
-            </a:r>
-            <a:r>
-              <a:rPr lang="de-DE" dirty="0"/>
-              <a:t> </a:t>
-            </a:r>
-            <a:r>
-              <a:rPr lang="de-DE" dirty="0" err="1"/>
-              <a:t>spent</a:t>
-            </a:r>
-            <a:r>
-              <a:rPr lang="de-DE" dirty="0"/>
-              <a:t> on </a:t>
-            </a:r>
-            <a:r>
-              <a:rPr lang="de-DE" dirty="0" err="1"/>
-              <a:t>narcotics</a:t>
-            </a:r>
-            <a:r>
-              <a:rPr lang="de-DE" dirty="0"/>
-              <a:t> </a:t>
-            </a:r>
-            <a:r>
-              <a:rPr lang="de-DE" dirty="0" err="1"/>
-              <a:t>management</a:t>
-            </a:r>
-            <a:r>
-              <a:rPr lang="de-DE" dirty="0"/>
-              <a:t> </a:t>
-            </a:r>
-            <a:r>
-              <a:rPr lang="de-DE" dirty="0" err="1"/>
-              <a:t>reduced</a:t>
-            </a:r>
-            <a:r>
-              <a:rPr lang="de-DE" dirty="0"/>
-              <a:t> </a:t>
-            </a:r>
-            <a:r>
-              <a:rPr lang="de-DE" dirty="0" err="1"/>
-              <a:t>by</a:t>
-            </a:r>
-            <a:r>
-              <a:rPr lang="de-DE" dirty="0"/>
-              <a:t> </a:t>
-            </a:r>
-            <a:r>
-              <a:rPr lang="de-DE" dirty="0" err="1"/>
-              <a:t>estimated</a:t>
-            </a:r>
-            <a:r>
-              <a:rPr lang="de-DE" dirty="0"/>
-              <a:t>: </a:t>
-            </a:r>
-          </a:p>
-          <a:p>
-            <a:r>
-              <a:rPr lang="de-DE" dirty="0"/>
-              <a:t>180h per </a:t>
-            </a:r>
-            <a:r>
-              <a:rPr lang="de-DE" dirty="0" err="1"/>
-              <a:t>year</a:t>
-            </a:r>
-            <a:r>
-              <a:rPr lang="de-DE" dirty="0"/>
-              <a:t> </a:t>
-            </a:r>
-            <a:r>
-              <a:rPr lang="de-DE" dirty="0" err="1"/>
-              <a:t>without</a:t>
-            </a:r>
-            <a:r>
-              <a:rPr lang="de-DE" dirty="0"/>
-              <a:t> </a:t>
-            </a:r>
-            <a:r>
-              <a:rPr lang="de-DE" dirty="0" err="1"/>
-              <a:t>Narcovets</a:t>
-            </a:r>
-            <a:r>
-              <a:rPr lang="de-DE" dirty="0"/>
-              <a:t> </a:t>
-            </a:r>
-          </a:p>
-          <a:p>
-            <a:r>
-              <a:rPr lang="de-DE" dirty="0"/>
-              <a:t>67h per </a:t>
-            </a:r>
-            <a:r>
-              <a:rPr lang="de-DE" dirty="0" err="1"/>
-              <a:t>year</a:t>
-            </a:r>
-            <a:r>
-              <a:rPr lang="de-DE" dirty="0"/>
-              <a:t> </a:t>
-            </a:r>
-            <a:r>
-              <a:rPr lang="de-DE" dirty="0" err="1"/>
-              <a:t>with</a:t>
-            </a:r>
-            <a:r>
-              <a:rPr lang="de-DE" dirty="0"/>
-              <a:t> </a:t>
-            </a:r>
-            <a:r>
-              <a:rPr lang="de-DE" dirty="0" err="1"/>
-              <a:t>Narcovets</a:t>
-            </a:r>
-            <a:r>
-              <a:rPr lang="de-DE" dirty="0"/>
-              <a:t> </a:t>
-            </a:r>
-          </a:p>
-          <a:p>
-            <a:r>
-              <a:rPr lang="de-DE" dirty="0"/>
-              <a:t> </a:t>
-            </a:r>
-          </a:p>
-          <a:p>
-            <a:r>
-              <a:rPr lang="de-DE" dirty="0" err="1"/>
-              <a:t>Reduction</a:t>
-            </a:r>
-            <a:r>
-              <a:rPr lang="de-DE" dirty="0"/>
-              <a:t> on </a:t>
-            </a:r>
-            <a:r>
-              <a:rPr lang="de-DE" dirty="0" err="1"/>
-              <a:t>money</a:t>
-            </a:r>
-            <a:r>
-              <a:rPr lang="de-DE" dirty="0"/>
-              <a:t> </a:t>
-            </a:r>
-            <a:r>
-              <a:rPr lang="de-DE" dirty="0" err="1"/>
-              <a:t>spent</a:t>
-            </a:r>
-            <a:r>
-              <a:rPr lang="de-DE" dirty="0"/>
-              <a:t> on </a:t>
-            </a:r>
-            <a:r>
-              <a:rPr lang="de-DE" dirty="0" err="1"/>
-              <a:t>narcotics</a:t>
-            </a:r>
-            <a:r>
-              <a:rPr lang="de-DE" dirty="0"/>
-              <a:t> </a:t>
-            </a:r>
-            <a:r>
-              <a:rPr lang="de-DE" dirty="0" err="1"/>
-              <a:t>management</a:t>
-            </a:r>
-            <a:r>
-              <a:rPr lang="de-DE" dirty="0"/>
-              <a:t> </a:t>
-            </a:r>
-            <a:r>
-              <a:rPr lang="de-DE" dirty="0" err="1"/>
-              <a:t>reduced</a:t>
-            </a:r>
-            <a:r>
-              <a:rPr lang="de-DE" dirty="0"/>
-              <a:t> </a:t>
-            </a:r>
-            <a:r>
-              <a:rPr lang="de-DE" dirty="0" err="1"/>
-              <a:t>by</a:t>
-            </a:r>
-            <a:r>
-              <a:rPr lang="de-DE" dirty="0"/>
-              <a:t> </a:t>
-            </a:r>
-            <a:r>
-              <a:rPr lang="de-DE" dirty="0" err="1"/>
-              <a:t>estimated</a:t>
-            </a:r>
-            <a:r>
-              <a:rPr lang="de-DE" dirty="0"/>
-              <a:t>:</a:t>
-            </a:r>
-          </a:p>
-          <a:p>
-            <a:r>
-              <a:rPr lang="de-DE" dirty="0"/>
-              <a:t>10.000CHF per </a:t>
-            </a:r>
-            <a:r>
-              <a:rPr lang="de-DE" dirty="0" err="1"/>
-              <a:t>year</a:t>
-            </a:r>
-            <a:r>
-              <a:rPr lang="de-DE" dirty="0"/>
-              <a:t> </a:t>
-            </a:r>
-            <a:r>
-              <a:rPr lang="de-DE" dirty="0" err="1"/>
-              <a:t>without</a:t>
-            </a:r>
-            <a:r>
-              <a:rPr lang="de-DE" dirty="0"/>
-              <a:t> </a:t>
-            </a:r>
-            <a:r>
-              <a:rPr lang="de-DE" dirty="0" err="1"/>
-              <a:t>Narcovets</a:t>
-            </a:r>
-            <a:r>
-              <a:rPr lang="de-DE" dirty="0"/>
-              <a:t> </a:t>
-            </a:r>
-          </a:p>
-          <a:p>
-            <a:r>
-              <a:rPr lang="de-DE" dirty="0"/>
-              <a:t> 5.000CHF per </a:t>
-            </a:r>
-            <a:r>
-              <a:rPr lang="de-DE" dirty="0" err="1"/>
-              <a:t>year</a:t>
-            </a:r>
-            <a:r>
-              <a:rPr lang="de-DE" dirty="0"/>
-              <a:t> </a:t>
-            </a:r>
-            <a:r>
-              <a:rPr lang="de-DE" dirty="0" err="1"/>
-              <a:t>with</a:t>
-            </a:r>
-            <a:r>
-              <a:rPr lang="de-DE" dirty="0"/>
-              <a:t> </a:t>
-            </a:r>
-            <a:r>
-              <a:rPr lang="de-DE" dirty="0" err="1"/>
-              <a:t>Narcovets</a:t>
-            </a:r>
-            <a:r>
-              <a:rPr lang="de-DE" dirty="0"/>
-              <a:t> </a:t>
-            </a:r>
-          </a:p>
-          <a:p>
-            <a:endParaRPr lang="de-DE" dirty="0"/>
-          </a:p>
-          <a:p>
-            <a:r>
-              <a:rPr lang="de-DE" dirty="0"/>
-              <a:t>On top: </a:t>
-            </a:r>
-          </a:p>
-          <a:p>
-            <a:pPr marL="285750" indent="-285750">
-              <a:buFontTx/>
-              <a:buChar char="-"/>
-            </a:pPr>
-            <a:r>
-              <a:rPr lang="de-DE" dirty="0" err="1"/>
-              <a:t>Centralized</a:t>
-            </a:r>
-            <a:r>
-              <a:rPr lang="de-DE" dirty="0"/>
-              <a:t> </a:t>
-            </a:r>
-            <a:r>
-              <a:rPr lang="de-DE" dirty="0" err="1"/>
-              <a:t>documentation</a:t>
-            </a:r>
-            <a:r>
-              <a:rPr lang="de-DE" dirty="0"/>
-              <a:t> </a:t>
-            </a:r>
-          </a:p>
-          <a:p>
-            <a:pPr marL="285750" indent="-285750">
-              <a:buFontTx/>
-              <a:buChar char="-"/>
-            </a:pPr>
-            <a:r>
-              <a:rPr lang="de-DE" dirty="0" err="1"/>
-              <a:t>Less</a:t>
-            </a:r>
-            <a:r>
-              <a:rPr lang="de-DE" dirty="0"/>
-              <a:t> </a:t>
-            </a:r>
-            <a:r>
-              <a:rPr lang="de-DE" dirty="0" err="1"/>
-              <a:t>risk</a:t>
-            </a:r>
-            <a:r>
-              <a:rPr lang="de-DE" dirty="0"/>
-              <a:t> </a:t>
-            </a:r>
-            <a:r>
-              <a:rPr lang="de-DE" dirty="0" err="1"/>
-              <a:t>for</a:t>
-            </a:r>
-            <a:r>
-              <a:rPr lang="de-DE" dirty="0"/>
-              <a:t> human </a:t>
-            </a:r>
-            <a:r>
-              <a:rPr lang="de-DE" dirty="0" err="1"/>
-              <a:t>errors</a:t>
-            </a:r>
-            <a:r>
-              <a:rPr lang="de-DE" dirty="0"/>
-              <a:t> </a:t>
-            </a:r>
-            <a:r>
-              <a:rPr lang="de-DE" dirty="0" err="1"/>
-              <a:t>or</a:t>
-            </a:r>
-            <a:r>
-              <a:rPr lang="de-DE" dirty="0"/>
-              <a:t> human </a:t>
-            </a:r>
-            <a:r>
-              <a:rPr lang="de-DE" dirty="0" err="1"/>
-              <a:t>intervention</a:t>
-            </a:r>
-            <a:r>
-              <a:rPr lang="de-DE" dirty="0"/>
-              <a:t> </a:t>
-            </a:r>
-            <a:r>
-              <a:rPr lang="de-DE" dirty="0" err="1"/>
-              <a:t>to</a:t>
-            </a:r>
-            <a:r>
-              <a:rPr lang="de-DE" dirty="0"/>
-              <a:t> </a:t>
-            </a:r>
-            <a:r>
-              <a:rPr lang="de-DE" dirty="0" err="1"/>
-              <a:t>cheat</a:t>
-            </a:r>
-            <a:r>
-              <a:rPr lang="de-DE" dirty="0"/>
-              <a:t> </a:t>
-            </a:r>
-            <a:r>
-              <a:rPr lang="de-DE" dirty="0" err="1"/>
-              <a:t>wrong</a:t>
-            </a:r>
-            <a:r>
-              <a:rPr lang="de-DE" dirty="0"/>
-              <a:t> </a:t>
-            </a:r>
-            <a:r>
-              <a:rPr lang="de-DE" dirty="0" err="1"/>
-              <a:t>numbers</a:t>
-            </a:r>
-            <a:r>
-              <a:rPr lang="de-DE" dirty="0"/>
-              <a:t> </a:t>
-            </a:r>
-          </a:p>
-        </p:txBody>
-      </p:sp>
-    </p:spTree>
-    <p:extLst>
-      <p:ext uri="{BB962C8B-B14F-4D97-AF65-F5344CB8AC3E}">
-        <p14:creationId xmlns:p14="http://schemas.microsoft.com/office/powerpoint/2010/main" val="4087394814"/>
-      </p:ext>
-    </p:extLst>
-  </p:cSld>
-  <p:clrMapOvr>
-    <a:masterClrMapping/>
-  </p:clrMapOvr>
-</p:sld>
-</file>
-
-<file path=ppt/slides/slide12.xml><?xml version="1.0" encoding="utf-8"?>
-<p:sld xmlns:a="http://schemas.openxmlformats.org/drawingml/2006/main" xmlns:r="http://schemas.openxmlformats.org/officeDocument/2006/relationships" xmlns:p="http://schemas.openxmlformats.org/presentationml/2006/main">
-  <p:cSld>
-    <p:spTree>
-      <p:nvGrpSpPr>
-        <p:cNvPr id="1" name=""/>
-        <p:cNvGrpSpPr/>
-        <p:nvPr/>
-      </p:nvGrpSpPr>
-      <p:grpSpPr>
-        <a:xfrm>
-          <a:off x="0" y="0"/>
-          <a:ext cx="0" cy="0"/>
-          <a:chOff x="0" y="0"/>
-          <a:chExt cx="0" cy="0"/>
-        </a:xfrm>
-      </p:grpSpPr>
-      <p:sp>
-        <p:nvSpPr>
           <p:cNvPr id="3" name="Textfeld 2">
             <a:extLst>
               <a:ext uri="{FF2B5EF4-FFF2-40B4-BE49-F238E27FC236}">
@@ -4670,11 +4079,13 @@
             </a:lvl9pPr>
           </a:lstStyle>
           <a:p>
-            <a:r>
-              <a:rPr lang="de-DE"/>
+            <a:pPr marL="0" indent="0">
+              <a:buNone/>
+            </a:pPr>
+            <a:r>
+              <a:rPr lang="de-DE" sz="3000" b="1" dirty="0"/>
               <a:t>Problems</a:t>
             </a:r>
-            <a:endParaRPr lang="de-DE" dirty="0"/>
           </a:p>
         </p:txBody>
       </p:sp>
@@ -5166,11 +4577,13 @@
             </a:lvl9pPr>
           </a:lstStyle>
           <a:p>
-            <a:r>
-              <a:rPr lang="de-DE"/>
+            <a:pPr marL="0" indent="0">
+              <a:buNone/>
+            </a:pPr>
+            <a:r>
+              <a:rPr lang="de-DE" sz="3000" b="1" dirty="0"/>
               <a:t>Solutions</a:t>
             </a:r>
-            <a:endParaRPr lang="de-DE" dirty="0"/>
           </a:p>
         </p:txBody>
       </p:sp>
@@ -5382,7 +4795,7 @@
             </a:r>
             <a:r>
               <a:rPr lang="de-DE" dirty="0" err="1"/>
-              <a:t>digitalised</a:t>
+              <a:t>digitalized</a:t>
             </a:r>
             <a:r>
               <a:rPr lang="de-DE" dirty="0"/>
@@ -5410,44 +4823,10 @@
               <a:rPr lang="de-DE" dirty="0" err="1"/>
               <a:t>generation</a:t>
             </a:r>
-            <a:r>
-              <a:rPr lang="de-DE" dirty="0"/>
-              <a:t> </a:t>
-            </a:r>
-            <a:r>
-              <a:rPr lang="de-DE" dirty="0" err="1"/>
-              <a:t>for</a:t>
-            </a:r>
-            <a:r>
-              <a:rPr lang="de-DE" dirty="0"/>
-              <a:t> </a:t>
-            </a:r>
-            <a:r>
-              <a:rPr lang="de-DE" dirty="0" err="1"/>
-              <a:t>updated</a:t>
-            </a:r>
-            <a:r>
-              <a:rPr lang="de-DE" dirty="0"/>
-              <a:t> </a:t>
-            </a:r>
-            <a:r>
-              <a:rPr lang="de-DE" dirty="0" err="1"/>
-              <a:t>inventory</a:t>
-            </a:r>
-            <a:r>
-              <a:rPr lang="de-DE" dirty="0"/>
-              <a:t> </a:t>
-            </a:r>
-            <a:r>
-              <a:rPr lang="de-DE" dirty="0" err="1"/>
-              <a:t>lists</a:t>
-            </a:r>
-            <a:r>
-              <a:rPr lang="de-DE" dirty="0"/>
-              <a:t> </a:t>
-            </a:r>
-          </a:p>
-          <a:p>
+            <a:endParaRPr lang="de-DE" dirty="0"/>
+          </a:p>
+          <a:p>
+            <a:pPr lvl="1"/>
             <a:r>
               <a:rPr lang="de-DE" dirty="0" err="1"/>
               <a:t>For</a:t>
@@ -5468,17 +4847,21 @@
               <a:rPr lang="de-DE" dirty="0" err="1"/>
               <a:t>arrival</a:t>
             </a:r>
-            <a:r>
-              <a:rPr lang="de-DE" dirty="0"/>
-              <a:t> </a:t>
-            </a:r>
-            <a:r>
-              <a:rPr lang="de-DE" dirty="0" err="1"/>
-              <a:t>too</a:t>
-            </a:r>
-            <a:r>
-              <a:rPr lang="de-DE" dirty="0"/>
-              <a:t>? </a:t>
+            <a:endParaRPr lang="de-DE" dirty="0"/>
+          </a:p>
+          <a:p>
+            <a:pPr lvl="1"/>
+            <a:r>
+              <a:rPr lang="de-DE" dirty="0"/>
+              <a:t>Threshold </a:t>
+            </a:r>
+            <a:r>
+              <a:rPr lang="de-DE" dirty="0" err="1"/>
+              <a:t>warning</a:t>
+            </a:r>
+            <a:r>
+              <a:rPr lang="de-DE" dirty="0"/>
+              <a:t> </a:t>
             </a:r>
           </a:p>
           <a:p>
@@ -5558,7 +4941,7 @@
     </p:spTree>
     <p:extLst>
       <p:ext uri="{BB962C8B-B14F-4D97-AF65-F5344CB8AC3E}">
-        <p14:creationId xmlns:p14="http://schemas.microsoft.com/office/powerpoint/2010/main" val="2348197725"/>
+        <p14:creationId xmlns:p14="http://schemas.microsoft.com/office/powerpoint/2010/main" val="3817259487"/>
       </p:ext>
     </p:extLst>
   </p:cSld>
@@ -5664,7 +5047,29 @@
                   </a:schemeClr>
                 </a:solidFill>
               </a:rPr>
-              <a:t> takle:</a:t>
+              <a:t> </a:t>
+            </a:r>
+            <a:r>
+              <a:rPr lang="de-DE" dirty="0" err="1">
+                <a:solidFill>
+                  <a:schemeClr val="tx1">
+                    <a:lumMod val="50000"/>
+                    <a:lumOff val="50000"/>
+                  </a:schemeClr>
+                </a:solidFill>
+              </a:rPr>
+              <a:t>tackle</a:t>
+            </a:r>
+            <a:r>
+              <a:rPr lang="de-DE" dirty="0">
+                <a:solidFill>
+                  <a:schemeClr val="tx1">
+                    <a:lumMod val="50000"/>
+                    <a:lumOff val="50000"/>
+                  </a:schemeClr>
+                </a:solidFill>
+              </a:rPr>
+              <a:t>:</a:t>
             </a:r>
           </a:p>
         </p:txBody>
@@ -5721,145 +5126,78 @@
             </a:r>
             <a:r>
               <a:rPr lang="de-DE" dirty="0"/>
-              <a:t> – </a:t>
-            </a:r>
-            <a:r>
-              <a:rPr lang="de-DE" dirty="0" err="1"/>
-              <a:t>often</a:t>
-            </a:r>
-            <a:r>
-              <a:rPr lang="de-DE" dirty="0"/>
-              <a:t> </a:t>
-            </a:r>
-            <a:r>
-              <a:rPr lang="de-DE" dirty="0" err="1"/>
-              <a:t>paperwork</a:t>
-            </a:r>
-            <a:r>
-              <a:rPr lang="de-DE" dirty="0"/>
-              <a:t>, </a:t>
-            </a:r>
-            <a:r>
-              <a:rPr lang="de-DE" dirty="0" err="1"/>
+              <a:t> </a:t>
+            </a:r>
+            <a:endParaRPr lang="de-DE" dirty="0">
+              <a:sym typeface="Wingdings" panose="05000000000000000000" pitchFamily="2" charset="2"/>
+            </a:endParaRPr>
+          </a:p>
+          <a:p>
+            <a:r>
+              <a:rPr lang="de-DE" dirty="0" err="1">
+                <a:sym typeface="Wingdings" panose="05000000000000000000" pitchFamily="2" charset="2"/>
+              </a:rPr>
+              <a:t>Often</a:t>
+            </a:r>
+            <a:r>
+              <a:rPr lang="de-DE" dirty="0">
+                <a:sym typeface="Wingdings" panose="05000000000000000000" pitchFamily="2" charset="2"/>
+              </a:rPr>
+              <a:t> </a:t>
+            </a:r>
+            <a:r>
+              <a:rPr lang="de-DE" dirty="0" err="1">
+                <a:sym typeface="Wingdings" panose="05000000000000000000" pitchFamily="2" charset="2"/>
+              </a:rPr>
               <a:t>no</a:t>
             </a:r>
             <a:r>
-              <a:rPr lang="de-DE" dirty="0"/>
-              <a:t> </a:t>
-            </a:r>
-            <a:r>
-              <a:rPr lang="de-DE" dirty="0" err="1"/>
-              <a:t>digitalization</a:t>
-            </a:r>
-            <a:r>
-              <a:rPr lang="de-DE" dirty="0"/>
-              <a:t> </a:t>
-            </a:r>
-          </a:p>
-          <a:p>
-            <a:r>
-              <a:rPr lang="de-DE" dirty="0"/>
-              <a:t>Many </a:t>
-            </a:r>
-            <a:r>
-              <a:rPr lang="de-DE" dirty="0" err="1"/>
-              <a:t>individuals</a:t>
-            </a:r>
-            <a:r>
-              <a:rPr lang="de-DE" dirty="0"/>
-              <a:t> </a:t>
-            </a:r>
-            <a:r>
-              <a:rPr lang="de-DE" dirty="0" err="1"/>
-              <a:t>involved</a:t>
-            </a:r>
-            <a:r>
-              <a:rPr lang="de-DE" dirty="0"/>
-              <a:t> (</a:t>
-            </a:r>
-            <a:r>
-              <a:rPr lang="de-DE" dirty="0" err="1"/>
-              <a:t>veterinarian</a:t>
-            </a:r>
-            <a:r>
-              <a:rPr lang="de-DE" dirty="0"/>
-              <a:t>, </a:t>
-            </a:r>
-            <a:r>
-              <a:rPr lang="de-DE" dirty="0" err="1"/>
-              <a:t>team</a:t>
-            </a:r>
-            <a:r>
-              <a:rPr lang="de-DE" dirty="0"/>
-              <a:t> </a:t>
-            </a:r>
-            <a:r>
-              <a:rPr lang="de-DE" dirty="0" err="1"/>
-              <a:t>responsible</a:t>
-            </a:r>
-            <a:r>
-              <a:rPr lang="de-DE" dirty="0"/>
-              <a:t> </a:t>
-            </a:r>
-            <a:r>
-              <a:rPr lang="de-DE" dirty="0" err="1"/>
-              <a:t>for</a:t>
-            </a:r>
-            <a:r>
-              <a:rPr lang="de-DE" dirty="0"/>
-              <a:t> </a:t>
-            </a:r>
-            <a:r>
-              <a:rPr lang="de-DE" dirty="0" err="1"/>
-              <a:t>narcotics</a:t>
-            </a:r>
-            <a:r>
-              <a:rPr lang="de-DE" dirty="0"/>
-              <a:t>, </a:t>
-            </a:r>
-            <a:r>
-              <a:rPr lang="de-DE" dirty="0" err="1"/>
-              <a:t>team</a:t>
-            </a:r>
-            <a:r>
-              <a:rPr lang="de-DE" dirty="0"/>
-              <a:t> </a:t>
-            </a:r>
-            <a:r>
-              <a:rPr lang="de-DE" dirty="0" err="1"/>
-              <a:t>responsible</a:t>
-            </a:r>
-            <a:r>
-              <a:rPr lang="de-DE" dirty="0"/>
-              <a:t> </a:t>
-            </a:r>
-            <a:r>
-              <a:rPr lang="de-DE" dirty="0" err="1"/>
-              <a:t>for</a:t>
-            </a:r>
-            <a:r>
-              <a:rPr lang="de-DE" dirty="0"/>
-              <a:t> </a:t>
-            </a:r>
-            <a:r>
-              <a:rPr lang="de-DE" dirty="0" err="1"/>
-              <a:t>supply</a:t>
-            </a:r>
-            <a:r>
-              <a:rPr lang="de-DE" dirty="0"/>
-              <a:t> </a:t>
-            </a:r>
-            <a:r>
-              <a:rPr lang="de-DE" dirty="0" err="1"/>
-              <a:t>chain</a:t>
-            </a:r>
-            <a:r>
-              <a:rPr lang="de-DE" dirty="0"/>
-              <a:t>) – </a:t>
-            </a:r>
-            <a:r>
-              <a:rPr lang="de-DE" dirty="0" err="1"/>
-              <a:t>no</a:t>
+              <a:rPr lang="de-DE" dirty="0">
+                <a:sym typeface="Wingdings" panose="05000000000000000000" pitchFamily="2" charset="2"/>
+              </a:rPr>
+              <a:t> </a:t>
+            </a:r>
+            <a:r>
+              <a:rPr lang="de-DE" dirty="0" err="1">
+                <a:sym typeface="Wingdings" panose="05000000000000000000" pitchFamily="2" charset="2"/>
+              </a:rPr>
+              <a:t>automation</a:t>
+            </a:r>
+            <a:r>
+              <a:rPr lang="de-DE" dirty="0">
+                <a:sym typeface="Wingdings" panose="05000000000000000000" pitchFamily="2" charset="2"/>
+              </a:rPr>
+              <a:t> and </a:t>
+            </a:r>
+            <a:r>
+              <a:rPr lang="de-DE" dirty="0" err="1">
+                <a:sym typeface="Wingdings" panose="05000000000000000000" pitchFamily="2" charset="2"/>
+              </a:rPr>
+              <a:t>paper</a:t>
+            </a:r>
+            <a:r>
+              <a:rPr lang="de-DE" dirty="0">
+                <a:sym typeface="Wingdings" panose="05000000000000000000" pitchFamily="2" charset="2"/>
+              </a:rPr>
+              <a:t> </a:t>
+            </a:r>
+            <a:r>
+              <a:rPr lang="de-DE" dirty="0" err="1">
+                <a:sym typeface="Wingdings" panose="05000000000000000000" pitchFamily="2" charset="2"/>
+              </a:rPr>
+              <a:t>based</a:t>
+            </a:r>
+            <a:r>
+              <a:rPr lang="de-DE" dirty="0">
+                <a:sym typeface="Wingdings" panose="05000000000000000000" pitchFamily="2" charset="2"/>
+              </a:rPr>
+              <a:t> </a:t>
+            </a:r>
+          </a:p>
+          <a:p>
+            <a:r>
+              <a:rPr lang="de-DE" dirty="0" err="1"/>
+              <a:t>No</a:t>
             </a:r>
             <a:r>
               <a:rPr lang="de-DE" dirty="0"/>
@@ -5875,15 +5213,41 @@
             </a:r>
             <a:r>
               <a:rPr lang="de-DE" dirty="0" err="1"/>
-              <a:t>structures</a:t>
-            </a:r>
-            <a:r>
-              <a:rPr lang="de-DE" dirty="0"/>
-              <a:t>, </a:t>
-            </a:r>
-            <a:r>
-              <a:rPr lang="de-DE" dirty="0" err="1"/>
-              <a:t>some</a:t>
+              <a:t>path</a:t>
+            </a:r>
+            <a:r>
+              <a:rPr lang="de-DE" dirty="0"/>
+              <a:t> </a:t>
+            </a:r>
+            <a:r>
+              <a:rPr lang="de-DE" dirty="0" err="1"/>
+              <a:t>of</a:t>
+            </a:r>
+            <a:r>
+              <a:rPr lang="de-DE" dirty="0"/>
+              <a:t> </a:t>
+            </a:r>
+            <a:r>
+              <a:rPr lang="de-DE" dirty="0" err="1"/>
+              <a:t>communication</a:t>
+            </a:r>
+            <a:r>
+              <a:rPr lang="de-DE" dirty="0"/>
+              <a:t> </a:t>
+            </a:r>
+          </a:p>
+          <a:p>
+            <a:r>
+              <a:rPr lang="de-DE" dirty="0" err="1"/>
+              <a:t>No</a:t>
+            </a:r>
+            <a:r>
+              <a:rPr lang="de-DE" dirty="0"/>
+              <a:t> </a:t>
+            </a:r>
+            <a:r>
+              <a:rPr lang="de-DE" dirty="0" err="1"/>
+              <a:t>clear</a:t>
             </a:r>
             <a:r>
               <a:rPr lang="de-DE" dirty="0"/>
@@ -5895,46 +5259,11 @@
             </a:r>
             <a:r>
               <a:rPr lang="de-DE" dirty="0"/>
-              <a:t> not </a:t>
+              <a:t> </a:t>
             </a:r>
             <a:r>
               <a:rPr lang="de-DE" dirty="0" err="1"/>
               <a:t>defined</a:t>
-            </a:r>
-            <a:r>
-              <a:rPr lang="de-DE" dirty="0"/>
-              <a:t>/</a:t>
-            </a:r>
-            <a:r>
-              <a:rPr lang="de-DE" dirty="0" err="1"/>
-              <a:t>assigned</a:t>
-            </a:r>
-            <a:endParaRPr lang="de-DE" dirty="0"/>
-          </a:p>
-          <a:p>
-            <a:r>
-              <a:rPr lang="de-DE" dirty="0"/>
-              <a:t>Lots </a:t>
-            </a:r>
-            <a:r>
-              <a:rPr lang="de-DE" dirty="0" err="1"/>
-              <a:t>of</a:t>
-            </a:r>
-            <a:r>
-              <a:rPr lang="de-DE" dirty="0"/>
-              <a:t> time and </a:t>
-            </a:r>
-            <a:r>
-              <a:rPr lang="de-DE" dirty="0" err="1"/>
-              <a:t>money</a:t>
-            </a:r>
-            <a:r>
-              <a:rPr lang="de-DE" dirty="0"/>
-              <a:t> </a:t>
-            </a:r>
-            <a:r>
-              <a:rPr lang="de-DE" dirty="0" err="1"/>
-              <a:t>wasted</a:t>
             </a:r>
             <a:r>
               <a:rPr lang="de-DE" dirty="0"/>
@@ -5946,7 +5275,7 @@
     </p:spTree>
     <p:extLst>
       <p:ext uri="{BB962C8B-B14F-4D97-AF65-F5344CB8AC3E}">
-        <p14:creationId xmlns:p14="http://schemas.microsoft.com/office/powerpoint/2010/main" val="1805177892"/>
+        <p14:creationId xmlns:p14="http://schemas.microsoft.com/office/powerpoint/2010/main" val="2147259436"/>
       </p:ext>
     </p:extLst>
   </p:cSld>
@@ -6311,95 +5640,6 @@
   <p:cSld>
     <p:spTree>
       <p:nvGrpSpPr>
-        <p:cNvPr id="1" name=""/>
-        <p:cNvGrpSpPr/>
-        <p:nvPr/>
-      </p:nvGrpSpPr>
-      <p:grpSpPr>
-        <a:xfrm>
-          <a:off x="0" y="0"/>
-          <a:ext cx="0" cy="0"/>
-          <a:chOff x="0" y="0"/>
-          <a:chExt cx="0" cy="0"/>
-        </a:xfrm>
-      </p:grpSpPr>
-      <p:sp>
-        <p:nvSpPr>
-          <p:cNvPr id="2" name="Titel 1">
-            <a:extLst>
-              <a:ext uri="{FF2B5EF4-FFF2-40B4-BE49-F238E27FC236}">
-                <a16:creationId xmlns:a16="http://schemas.microsoft.com/office/drawing/2014/main" id="{D666A5C9-E59A-FA49-F279-247F2FB359B9}"/>
-              </a:ext>
-            </a:extLst>
-          </p:cNvPr>
-          <p:cNvSpPr>
-            <a:spLocks noGrp="1"/>
-          </p:cNvSpPr>
-          <p:nvPr>
-            <p:ph type="title"/>
-          </p:nvPr>
-        </p:nvSpPr>
-        <p:spPr>
-          <a:xfrm>
-            <a:off x="838200" y="4883336"/>
-            <a:ext cx="10515600" cy="1325563"/>
-          </a:xfrm>
-        </p:spPr>
-        <p:txBody>
-          <a:bodyPr/>
-          <a:lstStyle/>
-          <a:p>
-            <a:r>
-              <a:rPr lang="de-DE" dirty="0">
-                <a:solidFill>
-                  <a:schemeClr val="tx1">
-                    <a:lumMod val="50000"/>
-                    <a:lumOff val="50000"/>
-                  </a:schemeClr>
-                </a:solidFill>
-              </a:rPr>
-              <a:t>TO BE </a:t>
-            </a:r>
-            <a:r>
-              <a:rPr lang="de-DE" dirty="0" err="1">
-                <a:solidFill>
-                  <a:schemeClr val="tx1">
-                    <a:lumMod val="50000"/>
-                    <a:lumOff val="50000"/>
-                  </a:schemeClr>
-                </a:solidFill>
-              </a:rPr>
-              <a:t>Process</a:t>
-            </a:r>
-            <a:endParaRPr lang="de-DE" dirty="0">
-              <a:solidFill>
-                <a:schemeClr val="tx1">
-                  <a:lumMod val="50000"/>
-                  <a:lumOff val="50000"/>
-                </a:schemeClr>
-              </a:solidFill>
-            </a:endParaRPr>
-          </a:p>
-        </p:txBody>
-      </p:sp>
-    </p:spTree>
-    <p:extLst>
-      <p:ext uri="{BB962C8B-B14F-4D97-AF65-F5344CB8AC3E}">
-        <p14:creationId xmlns:p14="http://schemas.microsoft.com/office/powerpoint/2010/main" val="1477735491"/>
-      </p:ext>
-    </p:extLst>
-  </p:cSld>
-  <p:clrMapOvr>
-    <a:masterClrMapping/>
-  </p:clrMapOvr>
-</p:sld>
-</file>
-
-<file path=ppt/slides/slide6.xml><?xml version="1.0" encoding="utf-8"?>
-<p:sld xmlns:a="http://schemas.openxmlformats.org/drawingml/2006/main" xmlns:r="http://schemas.openxmlformats.org/officeDocument/2006/relationships" xmlns:p="http://schemas.openxmlformats.org/presentationml/2006/main">
-  <p:cSld>
-    <p:spTree>
-      <p:nvGrpSpPr>
         <p:cNvPr id="1" name="">
           <a:extLst>
             <a:ext uri="{FF2B5EF4-FFF2-40B4-BE49-F238E27FC236}">
@@ -6520,7 +5760,7 @@
 </p:sld>
 </file>
 
-<file path=ppt/slides/slide7.xml><?xml version="1.0" encoding="utf-8"?>
+<file path=ppt/slides/slide6.xml><?xml version="1.0" encoding="utf-8"?>
 <p:sld xmlns:a="http://schemas.openxmlformats.org/drawingml/2006/main" xmlns:r="http://schemas.openxmlformats.org/officeDocument/2006/relationships" xmlns:p="http://schemas.openxmlformats.org/presentationml/2006/main">
   <p:cSld>
     <p:spTree>
@@ -6675,6 +5915,414 @@
 </p:sld>
 </file>
 
+<file path=ppt/slides/slide7.xml><?xml version="1.0" encoding="utf-8"?>
+<p:sld xmlns:a="http://schemas.openxmlformats.org/drawingml/2006/main" xmlns:r="http://schemas.openxmlformats.org/officeDocument/2006/relationships" xmlns:p="http://schemas.openxmlformats.org/presentationml/2006/main">
+  <p:cSld>
+    <p:spTree>
+      <p:nvGrpSpPr>
+        <p:cNvPr id="1" name=""/>
+        <p:cNvGrpSpPr/>
+        <p:nvPr/>
+      </p:nvGrpSpPr>
+      <p:grpSpPr>
+        <a:xfrm>
+          <a:off x="0" y="0"/>
+          <a:ext cx="0" cy="0"/>
+          <a:chOff x="0" y="0"/>
+          <a:chExt cx="0" cy="0"/>
+        </a:xfrm>
+      </p:grpSpPr>
+      <p:sp>
+        <p:nvSpPr>
+          <p:cNvPr id="2" name="Titel 1">
+            <a:extLst>
+              <a:ext uri="{FF2B5EF4-FFF2-40B4-BE49-F238E27FC236}">
+                <a16:creationId xmlns:a16="http://schemas.microsoft.com/office/drawing/2014/main" id="{C77BCFB3-2ECD-706A-3128-06DCE4D8CA3C}"/>
+              </a:ext>
+            </a:extLst>
+          </p:cNvPr>
+          <p:cNvSpPr>
+            <a:spLocks noGrp="1"/>
+          </p:cNvSpPr>
+          <p:nvPr>
+            <p:ph type="title"/>
+          </p:nvPr>
+        </p:nvSpPr>
+        <p:spPr>
+          <a:xfrm>
+            <a:off x="841513" y="500062"/>
+            <a:ext cx="10515600" cy="1325563"/>
+          </a:xfrm>
+        </p:spPr>
+        <p:txBody>
+          <a:bodyPr/>
+          <a:lstStyle/>
+          <a:p>
+            <a:r>
+              <a:rPr lang="de-DE" dirty="0">
+                <a:solidFill>
+                  <a:schemeClr val="tx1">
+                    <a:lumMod val="50000"/>
+                    <a:lumOff val="50000"/>
+                  </a:schemeClr>
+                </a:solidFill>
+              </a:rPr>
+              <a:t>The </a:t>
+            </a:r>
+            <a:r>
+              <a:rPr lang="de-DE" dirty="0" err="1">
+                <a:solidFill>
+                  <a:schemeClr val="tx1">
+                    <a:lumMod val="50000"/>
+                    <a:lumOff val="50000"/>
+                  </a:schemeClr>
+                </a:solidFill>
+              </a:rPr>
+              <a:t>solution</a:t>
+            </a:r>
+            <a:r>
+              <a:rPr lang="de-DE" dirty="0">
+                <a:solidFill>
+                  <a:schemeClr val="tx1">
+                    <a:lumMod val="50000"/>
+                    <a:lumOff val="50000"/>
+                  </a:schemeClr>
+                </a:solidFill>
+              </a:rPr>
+              <a:t> </a:t>
+            </a:r>
+            <a:r>
+              <a:rPr lang="de-DE" dirty="0" err="1">
+                <a:solidFill>
+                  <a:schemeClr val="tx1">
+                    <a:lumMod val="50000"/>
+                    <a:lumOff val="50000"/>
+                  </a:schemeClr>
+                </a:solidFill>
+              </a:rPr>
+              <a:t>we</a:t>
+            </a:r>
+            <a:r>
+              <a:rPr lang="de-DE" dirty="0">
+                <a:solidFill>
+                  <a:schemeClr val="tx1">
+                    <a:lumMod val="50000"/>
+                    <a:lumOff val="50000"/>
+                  </a:schemeClr>
+                </a:solidFill>
+              </a:rPr>
+              <a:t> </a:t>
+            </a:r>
+            <a:r>
+              <a:rPr lang="de-DE" dirty="0" err="1">
+                <a:solidFill>
+                  <a:schemeClr val="tx1">
+                    <a:lumMod val="50000"/>
+                    <a:lumOff val="50000"/>
+                  </a:schemeClr>
+                </a:solidFill>
+              </a:rPr>
+              <a:t>provide</a:t>
+            </a:r>
+            <a:endParaRPr lang="de-DE" dirty="0">
+              <a:solidFill>
+                <a:schemeClr val="tx1">
+                  <a:lumMod val="50000"/>
+                  <a:lumOff val="50000"/>
+                </a:schemeClr>
+              </a:solidFill>
+            </a:endParaRPr>
+          </a:p>
+        </p:txBody>
+      </p:sp>
+      <p:sp>
+        <p:nvSpPr>
+          <p:cNvPr id="3" name="Inhaltsplatzhalter 2">
+            <a:extLst>
+              <a:ext uri="{FF2B5EF4-FFF2-40B4-BE49-F238E27FC236}">
+                <a16:creationId xmlns:a16="http://schemas.microsoft.com/office/drawing/2014/main" id="{B4F46ABD-8990-3714-E9FF-EE7A6C6357C4}"/>
+              </a:ext>
+            </a:extLst>
+          </p:cNvPr>
+          <p:cNvSpPr>
+            <a:spLocks noGrp="1"/>
+          </p:cNvSpPr>
+          <p:nvPr>
+            <p:ph idx="1"/>
+          </p:nvPr>
+        </p:nvSpPr>
+        <p:spPr>
+          <a:xfrm>
+            <a:off x="841513" y="2006600"/>
+            <a:ext cx="10515600" cy="4351338"/>
+          </a:xfrm>
+        </p:spPr>
+        <p:txBody>
+          <a:bodyPr>
+            <a:normAutofit lnSpcReduction="10000"/>
+          </a:bodyPr>
+          <a:lstStyle/>
+          <a:p>
+            <a:r>
+              <a:rPr lang="de-DE" dirty="0" err="1"/>
+              <a:t>talking</a:t>
+            </a:r>
+            <a:r>
+              <a:rPr lang="de-DE" dirty="0"/>
+              <a:t> </a:t>
+            </a:r>
+            <a:r>
+              <a:rPr lang="de-DE" dirty="0" err="1"/>
+              <a:t>about</a:t>
+            </a:r>
+            <a:r>
+              <a:rPr lang="de-DE" dirty="0"/>
+              <a:t> </a:t>
+            </a:r>
+            <a:r>
+              <a:rPr lang="de-DE" dirty="0" err="1"/>
+              <a:t>technical</a:t>
+            </a:r>
+            <a:r>
+              <a:rPr lang="de-DE" dirty="0"/>
+              <a:t> </a:t>
+            </a:r>
+            <a:r>
+              <a:rPr lang="de-DE" dirty="0" err="1"/>
+              <a:t>details</a:t>
+            </a:r>
+            <a:endParaRPr lang="de-DE" dirty="0"/>
+          </a:p>
+          <a:p>
+            <a:r>
+              <a:rPr lang="de-DE" dirty="0"/>
+              <a:t>Automation:</a:t>
+            </a:r>
+          </a:p>
+          <a:p>
+            <a:pPr lvl="1"/>
+            <a:r>
+              <a:rPr lang="de-DE" dirty="0"/>
+              <a:t> </a:t>
+            </a:r>
+            <a:r>
+              <a:rPr lang="de-DE" dirty="0" err="1"/>
+              <a:t>inventory</a:t>
+            </a:r>
+            <a:r>
+              <a:rPr lang="de-DE" dirty="0"/>
+              <a:t> </a:t>
+            </a:r>
+            <a:r>
+              <a:rPr lang="de-DE" dirty="0" err="1"/>
+              <a:t>is</a:t>
+            </a:r>
+            <a:r>
+              <a:rPr lang="de-DE" dirty="0"/>
+              <a:t> </a:t>
+            </a:r>
+            <a:r>
+              <a:rPr lang="de-DE" dirty="0" err="1"/>
+              <a:t>checked</a:t>
+            </a:r>
+            <a:r>
+              <a:rPr lang="de-DE" dirty="0"/>
+              <a:t> </a:t>
+            </a:r>
+            <a:r>
+              <a:rPr lang="de-DE" dirty="0" err="1"/>
+              <a:t>as</a:t>
+            </a:r>
+            <a:r>
+              <a:rPr lang="de-DE" dirty="0"/>
+              <a:t> time </a:t>
+            </a:r>
+            <a:r>
+              <a:rPr lang="de-DE" dirty="0" err="1"/>
+              <a:t>event</a:t>
+            </a:r>
+            <a:r>
+              <a:rPr lang="de-DE" dirty="0"/>
+              <a:t> </a:t>
+            </a:r>
+            <a:r>
+              <a:rPr lang="de-DE" dirty="0" err="1"/>
+              <a:t>automatically</a:t>
+            </a:r>
+            <a:endParaRPr lang="de-DE" dirty="0"/>
+          </a:p>
+          <a:p>
+            <a:pPr lvl="2"/>
+            <a:r>
+              <a:rPr lang="de-DE" dirty="0"/>
+              <a:t>Returns </a:t>
+            </a:r>
+            <a:r>
+              <a:rPr lang="de-DE" dirty="0" err="1"/>
+              <a:t>if</a:t>
+            </a:r>
+            <a:r>
+              <a:rPr lang="de-DE" dirty="0"/>
+              <a:t> </a:t>
+            </a:r>
+            <a:r>
+              <a:rPr lang="de-DE" dirty="0" err="1"/>
+              <a:t>threshold</a:t>
+            </a:r>
+            <a:r>
+              <a:rPr lang="de-DE" dirty="0"/>
+              <a:t> </a:t>
+            </a:r>
+            <a:r>
+              <a:rPr lang="de-DE" dirty="0" err="1"/>
+              <a:t>is</a:t>
+            </a:r>
+            <a:r>
+              <a:rPr lang="de-DE" dirty="0"/>
+              <a:t> </a:t>
+            </a:r>
+            <a:r>
+              <a:rPr lang="de-DE" dirty="0" err="1"/>
+              <a:t>under</a:t>
+            </a:r>
+            <a:r>
+              <a:rPr lang="de-DE" dirty="0"/>
+              <a:t> </a:t>
+            </a:r>
+            <a:r>
+              <a:rPr lang="de-DE" dirty="0" err="1"/>
+              <a:t>orover</a:t>
+            </a:r>
+            <a:r>
+              <a:rPr lang="de-DE" dirty="0"/>
+              <a:t> </a:t>
+            </a:r>
+            <a:r>
+              <a:rPr lang="de-DE" dirty="0" err="1"/>
+              <a:t>limit</a:t>
+            </a:r>
+            <a:r>
+              <a:rPr lang="de-DE" dirty="0"/>
+              <a:t> </a:t>
+            </a:r>
+          </a:p>
+          <a:p>
+            <a:pPr lvl="1"/>
+            <a:r>
+              <a:rPr lang="de-DE" dirty="0" err="1"/>
+              <a:t>placeholder</a:t>
+            </a:r>
+            <a:endParaRPr lang="de-DE" dirty="0"/>
+          </a:p>
+          <a:p>
+            <a:pPr marL="0" indent="0">
+              <a:buNone/>
+            </a:pPr>
+            <a:endParaRPr lang="de-DE" dirty="0"/>
+          </a:p>
+          <a:p>
+            <a:r>
+              <a:rPr lang="de-DE" dirty="0" err="1"/>
+              <a:t>Unification</a:t>
+            </a:r>
+            <a:r>
+              <a:rPr lang="de-DE" dirty="0"/>
+              <a:t>: </a:t>
+            </a:r>
+          </a:p>
+          <a:p>
+            <a:r>
+              <a:rPr lang="de-DE" dirty="0" err="1"/>
+              <a:t>Decision</a:t>
+            </a:r>
+            <a:r>
+              <a:rPr lang="de-DE" dirty="0"/>
+              <a:t> support: </a:t>
+            </a:r>
+          </a:p>
+          <a:p>
+            <a:r>
+              <a:rPr lang="de-DE" dirty="0"/>
+              <a:t> </a:t>
+            </a:r>
+            <a:r>
+              <a:rPr lang="de-DE" dirty="0" err="1"/>
+              <a:t>use</a:t>
+            </a:r>
+            <a:r>
+              <a:rPr lang="de-DE" dirty="0"/>
+              <a:t> </a:t>
+            </a:r>
+            <a:r>
+              <a:rPr lang="de-DE" dirty="0" err="1"/>
+              <a:t>of</a:t>
+            </a:r>
+            <a:r>
+              <a:rPr lang="de-DE" dirty="0"/>
+              <a:t> </a:t>
+            </a:r>
+            <a:r>
+              <a:rPr lang="de-DE" dirty="0" err="1"/>
+              <a:t>Camunda</a:t>
+            </a:r>
+            <a:r>
+              <a:rPr lang="de-DE" dirty="0"/>
+              <a:t>, Python, </a:t>
+            </a:r>
+          </a:p>
+          <a:p>
+            <a:r>
+              <a:rPr lang="de-DE" dirty="0"/>
+              <a:t>Multiple </a:t>
+            </a:r>
+            <a:r>
+              <a:rPr lang="de-DE" dirty="0" err="1"/>
+              <a:t>service</a:t>
+            </a:r>
+            <a:r>
+              <a:rPr lang="de-DE" dirty="0"/>
+              <a:t> </a:t>
+            </a:r>
+            <a:r>
+              <a:rPr lang="de-DE" dirty="0" err="1"/>
+              <a:t>tasks</a:t>
+            </a:r>
+            <a:r>
+              <a:rPr lang="de-DE" dirty="0"/>
+              <a:t>, </a:t>
+            </a:r>
+            <a:r>
+              <a:rPr lang="de-DE" dirty="0" err="1"/>
+              <a:t>Decision</a:t>
+            </a:r>
+            <a:r>
+              <a:rPr lang="de-DE" dirty="0"/>
+              <a:t> </a:t>
+            </a:r>
+            <a:r>
+              <a:rPr lang="de-DE" dirty="0" err="1"/>
+              <a:t>modeling</a:t>
+            </a:r>
+            <a:r>
+              <a:rPr lang="de-DE" dirty="0"/>
+              <a:t> </a:t>
+            </a:r>
+          </a:p>
+        </p:txBody>
+      </p:sp>
+    </p:spTree>
+    <p:extLst>
+      <p:ext uri="{BB962C8B-B14F-4D97-AF65-F5344CB8AC3E}">
+        <p14:creationId xmlns:p14="http://schemas.microsoft.com/office/powerpoint/2010/main" val="1415540745"/>
+      </p:ext>
+    </p:extLst>
+  </p:cSld>
+  <p:clrMapOvr>
+    <a:masterClrMapping/>
+  </p:clrMapOvr>
+</p:sld>
+</file>
+
 <file path=ppt/slides/slide8.xml><?xml version="1.0" encoding="utf-8"?>
 <p:sld xmlns:a="http://schemas.openxmlformats.org/drawingml/2006/main" xmlns:r="http://schemas.openxmlformats.org/officeDocument/2006/relationships" xmlns:p="http://schemas.openxmlformats.org/presentationml/2006/main">
   <p:cSld>
@@ -6697,7 +6345,7 @@
           <p:cNvPr id="2" name="Titel 1">
             <a:extLst>
               <a:ext uri="{FF2B5EF4-FFF2-40B4-BE49-F238E27FC236}">
-                <a16:creationId xmlns:a16="http://schemas.microsoft.com/office/drawing/2014/main" id="{C77BCFB3-2ECD-706A-3128-06DCE4D8CA3C}"/>
+                <a16:creationId xmlns:a16="http://schemas.microsoft.com/office/drawing/2014/main" id="{2E49F884-6A40-EE2A-90B8-8C104D63DBF1}"/>
               </a:ext>
             </a:extLst>
           </p:cNvPr>
@@ -6710,7 +6358,7 @@
         </p:nvSpPr>
         <p:spPr>
           <a:xfrm>
-            <a:off x="841513" y="500062"/>
+            <a:off x="838200" y="501743"/>
             <a:ext cx="10515600" cy="1325563"/>
           </a:xfrm>
         </p:spPr>
@@ -6727,71 +6375,12 @@
                   </a:schemeClr>
                 </a:solidFill>
               </a:rPr>
-              <a:t>The </a:t>
-            </a:r>
-            <a:r>
-              <a:rPr lang="de-DE" dirty="0" err="1">
-                <a:solidFill>
-                  <a:schemeClr val="tx1">
-                    <a:lumMod val="50000"/>
-                    <a:lumOff val="50000"/>
-                  </a:schemeClr>
-                </a:solidFill>
-              </a:rPr>
-              <a:t>solution</a:t>
-            </a:r>
-            <a:r>
-              <a:rPr lang="de-DE" dirty="0">
-                <a:solidFill>
-                  <a:schemeClr val="tx1">
-                    <a:lumMod val="50000"/>
-                    <a:lumOff val="50000"/>
-                  </a:schemeClr>
-                </a:solidFill>
-              </a:rPr>
-              <a:t> </a:t>
-            </a:r>
-            <a:r>
-              <a:rPr lang="de-DE" dirty="0" err="1">
-                <a:solidFill>
-                  <a:schemeClr val="tx1">
-                    <a:lumMod val="50000"/>
-                    <a:lumOff val="50000"/>
-                  </a:schemeClr>
-                </a:solidFill>
-              </a:rPr>
-              <a:t>we</a:t>
-            </a:r>
-            <a:r>
-              <a:rPr lang="de-DE" dirty="0">
-                <a:solidFill>
-                  <a:schemeClr val="tx1">
-                    <a:lumMod val="50000"/>
-                    <a:lumOff val="50000"/>
-                  </a:schemeClr>
-                </a:solidFill>
-              </a:rPr>
-              <a:t> </a:t>
-            </a:r>
-            <a:r>
-              <a:rPr lang="de-DE" dirty="0" err="1">
-                <a:solidFill>
-                  <a:schemeClr val="tx1">
-                    <a:lumMod val="50000"/>
-                    <a:lumOff val="50000"/>
-                  </a:schemeClr>
-                </a:solidFill>
-              </a:rPr>
-              <a:t>provide</a:t>
-            </a:r>
-            <a:endParaRPr lang="de-DE" dirty="0">
-              <a:solidFill>
-                <a:schemeClr val="tx1">
-                  <a:lumMod val="50000"/>
-                  <a:lumOff val="50000"/>
-                </a:schemeClr>
-              </a:solidFill>
-            </a:endParaRPr>
+              <a:t>Demonstration</a:t>
+            </a:r>
+            <a:r>
+              <a:rPr lang="de-DE" dirty="0"/>
+              <a:t> </a:t>
+            </a:r>
           </a:p>
         </p:txBody>
       </p:sp>
@@ -6800,7 +6389,7 @@
           <p:cNvPr id="3" name="Inhaltsplatzhalter 2">
             <a:extLst>
               <a:ext uri="{FF2B5EF4-FFF2-40B4-BE49-F238E27FC236}">
-                <a16:creationId xmlns:a16="http://schemas.microsoft.com/office/drawing/2014/main" id="{B4F46ABD-8990-3714-E9FF-EE7A6C6357C4}"/>
+                <a16:creationId xmlns:a16="http://schemas.microsoft.com/office/drawing/2014/main" id="{306985A2-0C8B-1392-6737-3420007893C9}"/>
               </a:ext>
             </a:extLst>
           </p:cNvPr>
@@ -6813,259 +6402,72 @@
         </p:nvSpPr>
         <p:spPr>
           <a:xfrm>
-            <a:off x="841513" y="2006600"/>
+            <a:off x="838200" y="2004919"/>
             <a:ext cx="10515600" cy="4351338"/>
           </a:xfrm>
         </p:spPr>
         <p:txBody>
-          <a:bodyPr>
-            <a:normAutofit lnSpcReduction="10000"/>
-          </a:bodyPr>
+          <a:bodyPr/>
           <a:lstStyle/>
           <a:p>
-            <a:r>
-              <a:rPr lang="de-DE" dirty="0" err="1"/>
-              <a:t>talking</a:t>
-            </a:r>
-            <a:r>
-              <a:rPr lang="de-DE" dirty="0"/>
-              <a:t> </a:t>
-            </a:r>
-            <a:r>
-              <a:rPr lang="de-DE" dirty="0" err="1"/>
-              <a:t>about</a:t>
-            </a:r>
-            <a:r>
-              <a:rPr lang="de-DE" dirty="0"/>
-              <a:t> </a:t>
-            </a:r>
-            <a:r>
-              <a:rPr lang="de-DE" dirty="0" err="1"/>
-              <a:t>technical</a:t>
-            </a:r>
-            <a:r>
-              <a:rPr lang="de-DE" dirty="0"/>
-              <a:t> </a:t>
-            </a:r>
-            <a:r>
-              <a:rPr lang="de-DE" dirty="0" err="1"/>
-              <a:t>details</a:t>
-            </a:r>
-            <a:endParaRPr lang="de-DE" dirty="0"/>
-          </a:p>
-          <a:p>
-            <a:r>
-              <a:rPr lang="de-DE" dirty="0"/>
-              <a:t>Automation:</a:t>
-            </a:r>
-          </a:p>
-          <a:p>
-            <a:pPr lvl="1"/>
-            <a:r>
-              <a:rPr lang="de-DE" dirty="0"/>
-              <a:t> </a:t>
-            </a:r>
-            <a:r>
-              <a:rPr lang="de-DE" dirty="0" err="1"/>
-              <a:t>inventory</a:t>
-            </a:r>
-            <a:r>
-              <a:rPr lang="de-DE" dirty="0"/>
-              <a:t> </a:t>
-            </a:r>
-            <a:r>
-              <a:rPr lang="de-DE" dirty="0" err="1"/>
-              <a:t>is</a:t>
-            </a:r>
-            <a:r>
-              <a:rPr lang="de-DE" dirty="0"/>
-              <a:t> </a:t>
-            </a:r>
-            <a:r>
-              <a:rPr lang="de-DE" dirty="0" err="1"/>
-              <a:t>checked</a:t>
-            </a:r>
-            <a:r>
-              <a:rPr lang="de-DE" dirty="0"/>
-              <a:t> </a:t>
-            </a:r>
-            <a:r>
-              <a:rPr lang="de-DE" dirty="0" err="1"/>
-              <a:t>as</a:t>
-            </a:r>
-            <a:r>
-              <a:rPr lang="de-DE" dirty="0"/>
-              <a:t> time </a:t>
-            </a:r>
-            <a:r>
-              <a:rPr lang="de-DE" dirty="0" err="1"/>
-              <a:t>event</a:t>
-            </a:r>
-            <a:r>
-              <a:rPr lang="de-DE" dirty="0"/>
-              <a:t> </a:t>
-            </a:r>
-            <a:r>
-              <a:rPr lang="de-DE" dirty="0" err="1"/>
-              <a:t>automatically</a:t>
-            </a:r>
-            <a:endParaRPr lang="de-DE" dirty="0"/>
-          </a:p>
-          <a:p>
-            <a:pPr lvl="2"/>
-            <a:r>
-              <a:rPr lang="de-DE" dirty="0"/>
-              <a:t>Returns </a:t>
-            </a:r>
-            <a:r>
-              <a:rPr lang="de-DE" dirty="0" err="1"/>
-              <a:t>if</a:t>
-            </a:r>
-            <a:r>
-              <a:rPr lang="de-DE" dirty="0"/>
-              <a:t> </a:t>
-            </a:r>
-            <a:r>
-              <a:rPr lang="de-DE" dirty="0" err="1"/>
-              <a:t>threshold</a:t>
-            </a:r>
-            <a:r>
-              <a:rPr lang="de-DE" dirty="0"/>
-              <a:t> </a:t>
-            </a:r>
-            <a:r>
-              <a:rPr lang="de-DE" dirty="0" err="1"/>
-              <a:t>is</a:t>
-            </a:r>
-            <a:r>
-              <a:rPr lang="de-DE" dirty="0"/>
-              <a:t> </a:t>
-            </a:r>
-            <a:r>
-              <a:rPr lang="de-DE" dirty="0" err="1"/>
-              <a:t>under</a:t>
-            </a:r>
-            <a:r>
-              <a:rPr lang="de-DE" dirty="0"/>
-              <a:t> </a:t>
-            </a:r>
-            <a:r>
-              <a:rPr lang="de-DE" dirty="0" err="1"/>
-              <a:t>orover</a:t>
-            </a:r>
-            <a:r>
-              <a:rPr lang="de-DE" dirty="0"/>
-              <a:t> </a:t>
-            </a:r>
-            <a:r>
-              <a:rPr lang="de-DE" dirty="0" err="1"/>
-              <a:t>limit</a:t>
-            </a:r>
-            <a:r>
-              <a:rPr lang="de-DE" dirty="0"/>
-              <a:t> </a:t>
-            </a:r>
-          </a:p>
-          <a:p>
-            <a:pPr lvl="1"/>
-            <a:r>
-              <a:rPr lang="de-DE" dirty="0" err="1"/>
-              <a:t>placeholder</a:t>
-            </a:r>
-            <a:endParaRPr lang="de-DE" dirty="0"/>
-          </a:p>
-          <a:p>
             <a:pPr marL="0" indent="0">
               <a:buNone/>
             </a:pPr>
-            <a:endParaRPr lang="de-DE" dirty="0"/>
-          </a:p>
-          <a:p>
-            <a:r>
-              <a:rPr lang="de-DE" dirty="0" err="1"/>
-              <a:t>Unification</a:t>
-            </a:r>
-            <a:r>
-              <a:rPr lang="de-DE" dirty="0"/>
-              <a:t>: </a:t>
-            </a:r>
-          </a:p>
-          <a:p>
-            <a:r>
-              <a:rPr lang="de-DE" dirty="0" err="1"/>
-              <a:t>Decision</a:t>
-            </a:r>
-            <a:r>
-              <a:rPr lang="de-DE" dirty="0"/>
-              <a:t> support: </a:t>
-            </a:r>
-          </a:p>
-          <a:p>
-            <a:r>
-              <a:rPr lang="de-DE" dirty="0"/>
-              <a:t> </a:t>
-            </a:r>
-            <a:r>
-              <a:rPr lang="de-DE" dirty="0" err="1"/>
-              <a:t>use</a:t>
-            </a:r>
-            <a:r>
-              <a:rPr lang="de-DE" dirty="0"/>
-              <a:t> </a:t>
-            </a:r>
-            <a:r>
-              <a:rPr lang="de-DE" dirty="0" err="1"/>
-              <a:t>of</a:t>
-            </a:r>
-            <a:r>
-              <a:rPr lang="de-DE" dirty="0"/>
-              <a:t> </a:t>
-            </a:r>
-            <a:r>
-              <a:rPr lang="de-DE" dirty="0" err="1"/>
-              <a:t>Camunda</a:t>
-            </a:r>
-            <a:r>
-              <a:rPr lang="de-DE" dirty="0"/>
-              <a:t>, Python, </a:t>
-            </a:r>
-          </a:p>
-          <a:p>
-            <a:r>
-              <a:rPr lang="de-DE" dirty="0"/>
-              <a:t>Multiple </a:t>
-            </a:r>
-            <a:r>
-              <a:rPr lang="de-DE" dirty="0" err="1"/>
-              <a:t>service</a:t>
-            </a:r>
-            <a:r>
-              <a:rPr lang="de-DE" dirty="0"/>
-              <a:t> </a:t>
-            </a:r>
-            <a:r>
-              <a:rPr lang="de-DE" dirty="0" err="1"/>
-              <a:t>tasks</a:t>
-            </a:r>
-            <a:r>
-              <a:rPr lang="de-DE" dirty="0"/>
-              <a:t>, </a:t>
-            </a:r>
-            <a:r>
-              <a:rPr lang="de-DE" dirty="0" err="1"/>
-              <a:t>Decision</a:t>
-            </a:r>
-            <a:r>
-              <a:rPr lang="de-DE" dirty="0"/>
-              <a:t> </a:t>
-            </a:r>
-            <a:r>
-              <a:rPr lang="de-DE" dirty="0" err="1"/>
-              <a:t>modeling</a:t>
-            </a:r>
-            <a:r>
-              <a:rPr lang="de-DE" dirty="0"/>
-              <a:t> </a:t>
+            <a:r>
+              <a:rPr lang="de-DE" dirty="0" err="1"/>
+              <a:t>Let</a:t>
+            </a:r>
+            <a:r>
+              <a:rPr lang="de-DE" dirty="0"/>
+              <a:t> </a:t>
+            </a:r>
+            <a:r>
+              <a:rPr lang="de-DE" dirty="0" err="1"/>
+              <a:t>us</a:t>
+            </a:r>
+            <a:r>
+              <a:rPr lang="de-DE" dirty="0"/>
+              <a:t> </a:t>
+            </a:r>
+            <a:r>
+              <a:rPr lang="de-DE" dirty="0" err="1"/>
+              <a:t>show</a:t>
+            </a:r>
+            <a:r>
+              <a:rPr lang="de-DE" dirty="0"/>
+              <a:t> </a:t>
+            </a:r>
+            <a:r>
+              <a:rPr lang="de-DE" dirty="0" err="1"/>
+              <a:t>it</a:t>
+            </a:r>
+            <a:r>
+              <a:rPr lang="de-DE" dirty="0"/>
+              <a:t> </a:t>
+            </a:r>
+            <a:r>
+              <a:rPr lang="de-DE" dirty="0" err="1"/>
+              <a:t>to</a:t>
+            </a:r>
+            <a:r>
+              <a:rPr lang="de-DE" dirty="0"/>
+              <a:t> </a:t>
+            </a:r>
+            <a:r>
+              <a:rPr lang="de-DE" dirty="0" err="1"/>
+              <a:t>you</a:t>
+            </a:r>
+            <a:r>
+              <a:rPr lang="de-DE" dirty="0"/>
+              <a:t> in a </a:t>
+            </a:r>
+            <a:r>
+              <a:rPr lang="de-DE" dirty="0" err="1"/>
+              <a:t>video</a:t>
+            </a:r>
+            <a:r>
+              <a:rPr lang="de-DE" dirty="0"/>
+              <a:t>  </a:t>
             </a:r>
           </a:p>
         </p:txBody>
@@ -7073,7 +6475,7 @@
     </p:spTree>
     <p:extLst>
       <p:ext uri="{BB962C8B-B14F-4D97-AF65-F5344CB8AC3E}">
-        <p14:creationId xmlns:p14="http://schemas.microsoft.com/office/powerpoint/2010/main" val="1415540745"/>
+        <p14:creationId xmlns:p14="http://schemas.microsoft.com/office/powerpoint/2010/main" val="1146317798"/>
       </p:ext>
     </p:extLst>
   </p:cSld>
@@ -7105,7 +6507,7 @@
           <p:cNvPr id="2" name="Titel 1">
             <a:extLst>
               <a:ext uri="{FF2B5EF4-FFF2-40B4-BE49-F238E27FC236}">
-                <a16:creationId xmlns:a16="http://schemas.microsoft.com/office/drawing/2014/main" id="{28107D28-FA76-389F-2BF1-8C8EDDD35D16}"/>
+                <a16:creationId xmlns:a16="http://schemas.microsoft.com/office/drawing/2014/main" id="{22D8ECC0-E8B5-00F4-CDAC-994AFC71E380}"/>
               </a:ext>
             </a:extLst>
           </p:cNvPr>
@@ -7118,7 +6520,7 @@
         </p:nvSpPr>
         <p:spPr>
           <a:xfrm>
-            <a:off x="838200" y="500062"/>
+            <a:off x="838200" y="4872958"/>
             <a:ext cx="10515600" cy="1325563"/>
           </a:xfrm>
         </p:spPr>
@@ -7127,7 +6529,7 @@
           <a:lstStyle/>
           <a:p>
             <a:r>
-              <a:rPr lang="de-DE" dirty="0" err="1">
+              <a:rPr lang="de-DE" dirty="0">
                 <a:solidFill>
                   <a:schemeClr val="tx1">
                     <a:lumMod val="50000"/>
@@ -7135,119 +6537,383 @@
                   </a:schemeClr>
                 </a:solidFill>
               </a:rPr>
-              <a:t>How</a:t>
-            </a:r>
-            <a:r>
-              <a:rPr lang="de-DE" dirty="0">
-                <a:solidFill>
-                  <a:schemeClr val="tx1">
-                    <a:lumMod val="50000"/>
-                    <a:lumOff val="50000"/>
-                  </a:schemeClr>
-                </a:solidFill>
-              </a:rPr>
-              <a:t> </a:t>
-            </a:r>
-            <a:r>
-              <a:rPr lang="de-DE" dirty="0" err="1">
-                <a:solidFill>
-                  <a:schemeClr val="tx1">
-                    <a:lumMod val="50000"/>
-                    <a:lumOff val="50000"/>
-                  </a:schemeClr>
-                </a:solidFill>
-              </a:rPr>
-              <a:t>to</a:t>
-            </a:r>
-            <a:r>
-              <a:rPr lang="de-DE" dirty="0">
-                <a:solidFill>
-                  <a:schemeClr val="tx1">
-                    <a:lumMod val="50000"/>
-                    <a:lumOff val="50000"/>
-                  </a:schemeClr>
-                </a:solidFill>
-              </a:rPr>
-              <a:t> </a:t>
-            </a:r>
-            <a:r>
-              <a:rPr lang="de-DE" dirty="0" err="1">
-                <a:solidFill>
-                  <a:schemeClr val="tx1">
-                    <a:lumMod val="50000"/>
-                    <a:lumOff val="50000"/>
-                  </a:schemeClr>
-                </a:solidFill>
-              </a:rPr>
-              <a:t>implement</a:t>
-            </a:r>
-            <a:r>
-              <a:rPr lang="de-DE" dirty="0">
-                <a:solidFill>
-                  <a:schemeClr val="tx1">
-                    <a:lumMod val="50000"/>
-                    <a:lumOff val="50000"/>
-                  </a:schemeClr>
-                </a:solidFill>
-              </a:rPr>
-              <a:t> </a:t>
-            </a:r>
-            <a:r>
-              <a:rPr lang="de-DE" dirty="0" err="1">
-                <a:solidFill>
-                  <a:schemeClr val="tx1">
-                    <a:lumMod val="50000"/>
-                    <a:lumOff val="50000"/>
-                  </a:schemeClr>
-                </a:solidFill>
-              </a:rPr>
-              <a:t>Narcovet</a:t>
-            </a:r>
-            <a:endParaRPr lang="de-DE" dirty="0">
-              <a:solidFill>
-                <a:schemeClr val="tx1">
-                  <a:lumMod val="50000"/>
-                  <a:lumOff val="50000"/>
-                </a:schemeClr>
-              </a:solidFill>
-            </a:endParaRPr>
-          </a:p>
-        </p:txBody>
-      </p:sp>
-      <p:sp>
-        <p:nvSpPr>
-          <p:cNvPr id="3" name="Inhaltsplatzhalter 2">
-            <a:extLst>
-              <a:ext uri="{FF2B5EF4-FFF2-40B4-BE49-F238E27FC236}">
-                <a16:creationId xmlns:a16="http://schemas.microsoft.com/office/drawing/2014/main" id="{8CC658FB-A13A-CC0D-F682-EBE199A97437}"/>
-              </a:ext>
-            </a:extLst>
-          </p:cNvPr>
-          <p:cNvSpPr>
-            <a:spLocks noGrp="1"/>
-          </p:cNvSpPr>
-          <p:nvPr>
-            <p:ph idx="1"/>
-          </p:nvPr>
+              <a:t>Benefits</a:t>
+            </a:r>
+          </a:p>
+        </p:txBody>
+      </p:sp>
+      <p:sp>
+        <p:nvSpPr>
+          <p:cNvPr id="4" name="Textfeld 3">
+            <a:extLst>
+              <a:ext uri="{FF2B5EF4-FFF2-40B4-BE49-F238E27FC236}">
+                <a16:creationId xmlns:a16="http://schemas.microsoft.com/office/drawing/2014/main" id="{65756FEC-7821-2152-6E2C-7D131DA37680}"/>
+              </a:ext>
+            </a:extLst>
+          </p:cNvPr>
+          <p:cNvSpPr txBox="1"/>
+          <p:nvPr/>
         </p:nvSpPr>
         <p:spPr>
           <a:xfrm>
-            <a:off x="838200" y="2006600"/>
-            <a:ext cx="10515600" cy="4351338"/>
+            <a:off x="838200" y="1278911"/>
+            <a:ext cx="9403080" cy="3231654"/>
           </a:xfrm>
+          <a:prstGeom prst="rect">
+            <a:avLst/>
+          </a:prstGeom>
+          <a:noFill/>
         </p:spPr>
         <p:txBody>
-          <a:bodyPr/>
+          <a:bodyPr wrap="square" rtlCol="0">
+            <a:spAutoFit/>
+          </a:bodyPr>
           <a:lstStyle/>
           <a:p>
+            <a:r>
+              <a:rPr lang="de-DE" sz="2000" b="1" dirty="0" err="1"/>
+              <a:t>Reduction</a:t>
+            </a:r>
+            <a:r>
+              <a:rPr lang="de-DE" sz="2000" b="1" dirty="0"/>
+              <a:t> </a:t>
+            </a:r>
+            <a:r>
+              <a:rPr lang="de-DE" sz="2000" b="1" dirty="0" err="1"/>
+              <a:t>of</a:t>
+            </a:r>
+            <a:r>
+              <a:rPr lang="de-DE" sz="2000" b="1" dirty="0"/>
+              <a:t> </a:t>
+            </a:r>
+            <a:r>
+              <a:rPr lang="de-DE" sz="2000" b="1" dirty="0" err="1"/>
+              <a:t>hours</a:t>
+            </a:r>
+            <a:r>
+              <a:rPr lang="de-DE" sz="2000" dirty="0"/>
+              <a:t>: </a:t>
+            </a:r>
+          </a:p>
+          <a:p>
+            <a:pPr marL="285750" indent="-285750">
+              <a:buFont typeface="Arial" panose="020B0604020202020204" pitchFamily="34" charset="0"/>
+              <a:buChar char="•"/>
+            </a:pPr>
+            <a:r>
+              <a:rPr lang="de-DE" dirty="0"/>
+              <a:t>180h per </a:t>
+            </a:r>
+            <a:r>
+              <a:rPr lang="de-DE" dirty="0" err="1"/>
+              <a:t>year</a:t>
+            </a:r>
+            <a:r>
+              <a:rPr lang="de-DE" dirty="0"/>
+              <a:t> </a:t>
+            </a:r>
+            <a:r>
+              <a:rPr lang="de-DE" dirty="0" err="1"/>
+              <a:t>without</a:t>
+            </a:r>
+            <a:r>
+              <a:rPr lang="de-DE" dirty="0"/>
+              <a:t> </a:t>
+            </a:r>
+            <a:r>
+              <a:rPr lang="de-DE" dirty="0" err="1"/>
+              <a:t>Narcovets</a:t>
+            </a:r>
+            <a:r>
+              <a:rPr lang="de-DE" dirty="0"/>
+              <a:t> </a:t>
+            </a:r>
+          </a:p>
+          <a:p>
+            <a:pPr marL="285750" indent="-285750">
+              <a:buFont typeface="Arial" panose="020B0604020202020204" pitchFamily="34" charset="0"/>
+              <a:buChar char="•"/>
+            </a:pPr>
+            <a:r>
+              <a:rPr lang="de-DE" dirty="0"/>
+              <a:t>67h per </a:t>
+            </a:r>
+            <a:r>
+              <a:rPr lang="de-DE" dirty="0" err="1"/>
+              <a:t>year</a:t>
+            </a:r>
+            <a:r>
+              <a:rPr lang="de-DE" dirty="0"/>
+              <a:t> </a:t>
+            </a:r>
+            <a:r>
+              <a:rPr lang="de-DE" dirty="0" err="1"/>
+              <a:t>with</a:t>
+            </a:r>
+            <a:r>
+              <a:rPr lang="de-DE" dirty="0"/>
+              <a:t> </a:t>
+            </a:r>
+            <a:r>
+              <a:rPr lang="de-DE" dirty="0" err="1"/>
+              <a:t>Narcovets</a:t>
+            </a:r>
+            <a:r>
+              <a:rPr lang="de-DE" dirty="0"/>
+              <a:t> </a:t>
+            </a:r>
+          </a:p>
+          <a:p>
+            <a:r>
+              <a:rPr lang="de-DE" dirty="0"/>
+              <a:t> </a:t>
+            </a:r>
+          </a:p>
+          <a:p>
+            <a:r>
+              <a:rPr lang="de-DE" sz="2000" b="1" dirty="0" err="1"/>
+              <a:t>Reduction</a:t>
+            </a:r>
+            <a:r>
+              <a:rPr lang="de-DE" sz="2000" b="1" dirty="0"/>
+              <a:t> </a:t>
+            </a:r>
+            <a:r>
+              <a:rPr lang="de-DE" sz="2000" b="1" dirty="0" err="1"/>
+              <a:t>of</a:t>
+            </a:r>
+            <a:r>
+              <a:rPr lang="de-DE" sz="2000" b="1" dirty="0"/>
+              <a:t> </a:t>
+            </a:r>
+            <a:r>
+              <a:rPr lang="de-DE" sz="2000" b="1" dirty="0" err="1"/>
+              <a:t>expenses</a:t>
+            </a:r>
+            <a:r>
+              <a:rPr lang="de-DE" sz="2000" dirty="0"/>
+              <a:t>:</a:t>
+            </a:r>
+          </a:p>
+          <a:p>
+            <a:pPr marL="285750" indent="-285750">
+              <a:buFont typeface="Arial" panose="020B0604020202020204" pitchFamily="34" charset="0"/>
+              <a:buChar char="•"/>
+            </a:pPr>
+            <a:r>
+              <a:rPr lang="de-DE" dirty="0"/>
+              <a:t>10.000CHF per </a:t>
+            </a:r>
+            <a:r>
+              <a:rPr lang="de-DE" dirty="0" err="1"/>
+              <a:t>year</a:t>
+            </a:r>
+            <a:r>
+              <a:rPr lang="de-DE" dirty="0"/>
+              <a:t> </a:t>
+            </a:r>
+            <a:r>
+              <a:rPr lang="de-DE" dirty="0" err="1"/>
+              <a:t>without</a:t>
+            </a:r>
+            <a:r>
+              <a:rPr lang="de-DE" dirty="0"/>
+              <a:t> </a:t>
+            </a:r>
+            <a:r>
+              <a:rPr lang="de-DE" dirty="0" err="1"/>
+              <a:t>Narcovets</a:t>
+            </a:r>
+            <a:r>
+              <a:rPr lang="de-DE" dirty="0"/>
+              <a:t> </a:t>
+            </a:r>
+          </a:p>
+          <a:p>
+            <a:pPr marL="285750" indent="-285750">
+              <a:buFont typeface="Arial" panose="020B0604020202020204" pitchFamily="34" charset="0"/>
+              <a:buChar char="•"/>
+            </a:pPr>
+            <a:r>
+              <a:rPr lang="de-DE" dirty="0"/>
+              <a:t> 5.000CHF per </a:t>
+            </a:r>
+            <a:r>
+              <a:rPr lang="de-DE" dirty="0" err="1"/>
+              <a:t>year</a:t>
+            </a:r>
+            <a:r>
+              <a:rPr lang="de-DE" dirty="0"/>
+              <a:t> </a:t>
+            </a:r>
+            <a:r>
+              <a:rPr lang="de-DE" dirty="0" err="1"/>
+              <a:t>with</a:t>
+            </a:r>
+            <a:r>
+              <a:rPr lang="de-DE" dirty="0"/>
+              <a:t> </a:t>
+            </a:r>
+            <a:r>
+              <a:rPr lang="de-DE" dirty="0" err="1"/>
+              <a:t>Narcovets</a:t>
+            </a:r>
+            <a:r>
+              <a:rPr lang="de-DE" dirty="0"/>
+              <a:t> </a:t>
+            </a:r>
+          </a:p>
+          <a:p>
             <a:endParaRPr lang="de-DE" dirty="0"/>
+          </a:p>
+          <a:p>
+            <a:r>
+              <a:rPr lang="de-DE" sz="2000" b="1" dirty="0"/>
+              <a:t>Cherry on top</a:t>
+            </a:r>
+            <a:r>
+              <a:rPr lang="de-DE" sz="2000" dirty="0"/>
+              <a:t>: </a:t>
+            </a:r>
+          </a:p>
+          <a:p>
+            <a:pPr marL="285750" indent="-285750">
+              <a:buFont typeface="Arial" panose="020B0604020202020204" pitchFamily="34" charset="0"/>
+              <a:buChar char="•"/>
+            </a:pPr>
+            <a:r>
+              <a:rPr lang="de-DE" dirty="0" err="1"/>
+              <a:t>Centralized</a:t>
+            </a:r>
+            <a:r>
+              <a:rPr lang="de-DE" dirty="0"/>
+              <a:t> </a:t>
+            </a:r>
+            <a:r>
+              <a:rPr lang="de-DE" dirty="0" err="1"/>
+              <a:t>documentation</a:t>
+            </a:r>
+            <a:r>
+              <a:rPr lang="de-DE" dirty="0"/>
+              <a:t> </a:t>
+            </a:r>
+          </a:p>
+          <a:p>
+            <a:pPr marL="285750" indent="-285750">
+              <a:buFont typeface="Arial" panose="020B0604020202020204" pitchFamily="34" charset="0"/>
+              <a:buChar char="•"/>
+            </a:pPr>
+            <a:r>
+              <a:rPr lang="de-DE" dirty="0" err="1"/>
+              <a:t>Less</a:t>
+            </a:r>
+            <a:r>
+              <a:rPr lang="de-DE" dirty="0"/>
+              <a:t> </a:t>
+            </a:r>
+            <a:r>
+              <a:rPr lang="de-DE" dirty="0" err="1"/>
+              <a:t>risk</a:t>
+            </a:r>
+            <a:r>
+              <a:rPr lang="de-DE" dirty="0"/>
+              <a:t> </a:t>
+            </a:r>
+            <a:r>
+              <a:rPr lang="de-DE" dirty="0" err="1"/>
+              <a:t>for</a:t>
+            </a:r>
+            <a:r>
+              <a:rPr lang="de-DE" dirty="0"/>
+              <a:t> human </a:t>
+            </a:r>
+            <a:r>
+              <a:rPr lang="de-DE" dirty="0" err="1"/>
+              <a:t>errors</a:t>
+            </a:r>
+            <a:r>
+              <a:rPr lang="de-DE" dirty="0"/>
+              <a:t> </a:t>
+            </a:r>
+            <a:r>
+              <a:rPr lang="de-DE" dirty="0" err="1"/>
+              <a:t>or</a:t>
+            </a:r>
+            <a:r>
+              <a:rPr lang="de-DE" dirty="0"/>
+              <a:t> human </a:t>
+            </a:r>
+            <a:r>
+              <a:rPr lang="de-DE" dirty="0" err="1"/>
+              <a:t>intervention</a:t>
+            </a:r>
+            <a:r>
+              <a:rPr lang="de-DE" dirty="0"/>
+              <a:t> </a:t>
+            </a:r>
+            <a:r>
+              <a:rPr lang="de-DE" dirty="0" err="1"/>
+              <a:t>for</a:t>
+            </a:r>
+            <a:r>
+              <a:rPr lang="de-DE" dirty="0"/>
+              <a:t> </a:t>
+            </a:r>
+            <a:r>
+              <a:rPr lang="de-DE" dirty="0" err="1"/>
+              <a:t>misuse</a:t>
+            </a:r>
+            <a:r>
+              <a:rPr lang="de-DE" dirty="0"/>
+              <a:t> </a:t>
+            </a:r>
+          </a:p>
+        </p:txBody>
+      </p:sp>
+      <p:sp>
+        <p:nvSpPr>
+          <p:cNvPr id="3" name="Textfeld 2">
+            <a:extLst>
+              <a:ext uri="{FF2B5EF4-FFF2-40B4-BE49-F238E27FC236}">
+                <a16:creationId xmlns:a16="http://schemas.microsoft.com/office/drawing/2014/main" id="{02B33144-0A99-DA8E-FC69-72BECF079876}"/>
+              </a:ext>
+            </a:extLst>
+          </p:cNvPr>
+          <p:cNvSpPr txBox="1"/>
+          <p:nvPr/>
+        </p:nvSpPr>
+        <p:spPr>
+          <a:xfrm>
+            <a:off x="838200" y="647205"/>
+            <a:ext cx="3823932" cy="523220"/>
+          </a:xfrm>
+          <a:prstGeom prst="rect">
+            <a:avLst/>
+          </a:prstGeom>
+          <a:noFill/>
+        </p:spPr>
+        <p:txBody>
+          <a:bodyPr wrap="none" rtlCol="0">
+            <a:spAutoFit/>
+          </a:bodyPr>
+          <a:lstStyle/>
+          <a:p>
+            <a:r>
+              <a:rPr lang="de-DE" sz="2800" dirty="0"/>
+              <a:t>Narcotics </a:t>
+            </a:r>
+            <a:r>
+              <a:rPr lang="de-DE" sz="2800" dirty="0" err="1"/>
+              <a:t>management</a:t>
+            </a:r>
+            <a:endParaRPr lang="de-DE" sz="2800" dirty="0"/>
           </a:p>
         </p:txBody>
       </p:sp>
     </p:spTree>
     <p:extLst>
       <p:ext uri="{BB962C8B-B14F-4D97-AF65-F5344CB8AC3E}">
-        <p14:creationId xmlns:p14="http://schemas.microsoft.com/office/powerpoint/2010/main" val="3941973886"/>
+        <p14:creationId xmlns:p14="http://schemas.microsoft.com/office/powerpoint/2010/main" val="3002821077"/>
       </p:ext>
     </p:extLst>
   </p:cSld>

</xml_diff>